<commit_message>
updated presentation and added screen shots
</commit_message>
<xml_diff>
--- a/docs/Library Management System.pptx
+++ b/docs/Library Management System.pptx
@@ -8,13 +8,18 @@
     <p:sldId id="257" r:id="rId2"/>
     <p:sldId id="258" r:id="rId3"/>
     <p:sldId id="266" r:id="rId4"/>
-    <p:sldId id="259" r:id="rId5"/>
-    <p:sldId id="260" r:id="rId6"/>
-    <p:sldId id="261" r:id="rId7"/>
-    <p:sldId id="262" r:id="rId8"/>
-    <p:sldId id="265" r:id="rId9"/>
-    <p:sldId id="263" r:id="rId10"/>
-    <p:sldId id="264" r:id="rId11"/>
+    <p:sldId id="267" r:id="rId5"/>
+    <p:sldId id="259" r:id="rId6"/>
+    <p:sldId id="268" r:id="rId7"/>
+    <p:sldId id="260" r:id="rId8"/>
+    <p:sldId id="269" r:id="rId9"/>
+    <p:sldId id="261" r:id="rId10"/>
+    <p:sldId id="270" r:id="rId11"/>
+    <p:sldId id="262" r:id="rId12"/>
+    <p:sldId id="271" r:id="rId13"/>
+    <p:sldId id="265" r:id="rId14"/>
+    <p:sldId id="263" r:id="rId15"/>
+    <p:sldId id="264" r:id="rId16"/>
   </p:sldIdLst>
   <p:sldSz cx="9144000" cy="6858000" type="screen4x3"/>
   <p:notesSz cx="6858000" cy="9144000"/>
@@ -4330,16 +4335,41 @@
           <a:chExt cx="0" cy="0"/>
         </a:xfrm>
       </p:grpSpPr>
+      <p:sp>
+        <p:nvSpPr>
+          <p:cNvPr id="2" name="Title 1"/>
+          <p:cNvSpPr>
+            <a:spLocks noGrp="1"/>
+          </p:cNvSpPr>
+          <p:nvPr>
+            <p:ph type="title"/>
+          </p:nvPr>
+        </p:nvSpPr>
+        <p:spPr/>
+        <p:txBody>
+          <a:bodyPr>
+            <a:normAutofit/>
+          </a:bodyPr>
+          <a:lstStyle/>
+          <a:p>
+            <a:r>
+              <a:rPr lang="en-US" dirty="0" smtClean="0"/>
+              <a:t>Screen Shot – Add Book</a:t>
+            </a:r>
+            <a:endParaRPr lang="en-US" dirty="0"/>
+          </a:p>
+        </p:txBody>
+      </p:sp>
       <p:pic>
         <p:nvPicPr>
-          <p:cNvPr id="8194" name="Picture 2" descr="C:\Users\X230s\Downloads\hand-writes-the-word-thank-you_fyUln5HO.jpg"/>
+          <p:cNvPr id="4098" name="Picture 2" descr="C:\Users\X230s\Google Drive\MUM\MPP\Project\docs\addbook.png"/>
           <p:cNvPicPr>
             <a:picLocks noChangeAspect="1" noChangeArrowheads="1"/>
           </p:cNvPicPr>
           <p:nvPr/>
         </p:nvPicPr>
         <p:blipFill>
-          <a:blip r:embed="rId2" cstate="print"/>
+          <a:blip r:embed="rId2"/>
           <a:srcRect/>
           <a:stretch>
             <a:fillRect/>
@@ -4347,13 +4377,46 @@
         </p:blipFill>
         <p:spPr bwMode="auto">
           <a:xfrm>
-            <a:off x="1143000" y="838200"/>
-            <a:ext cx="7785906" cy="5191125"/>
+            <a:off x="304800" y="1219201"/>
+            <a:ext cx="4013043" cy="2666999"/>
           </a:xfrm>
           <a:prstGeom prst="rect">
             <a:avLst/>
           </a:prstGeom>
           <a:noFill/>
+        </p:spPr>
+      </p:pic>
+      <p:pic>
+        <p:nvPicPr>
+          <p:cNvPr id="4099" name="Picture 3"/>
+          <p:cNvPicPr>
+            <a:picLocks noChangeAspect="1" noChangeArrowheads="1"/>
+          </p:cNvPicPr>
+          <p:nvPr/>
+        </p:nvPicPr>
+        <p:blipFill>
+          <a:blip r:embed="rId3"/>
+          <a:srcRect/>
+          <a:stretch>
+            <a:fillRect/>
+          </a:stretch>
+        </p:blipFill>
+        <p:spPr bwMode="auto">
+          <a:xfrm>
+            <a:off x="3352800" y="3886200"/>
+            <a:ext cx="5619750" cy="2752725"/>
+          </a:xfrm>
+          <a:prstGeom prst="rect">
+            <a:avLst/>
+          </a:prstGeom>
+          <a:noFill/>
+          <a:ln w="9525">
+            <a:noFill/>
+            <a:miter lim="800000"/>
+            <a:headEnd/>
+            <a:tailEnd/>
+          </a:ln>
+          <a:effectLst/>
         </p:spPr>
       </p:pic>
     </p:spTree>
@@ -4371,430 +4434,7 @@
 </p:sld>
 </file>
 
-<file path=ppt/slides/slide2.xml><?xml version="1.0" encoding="utf-8"?>
-<p:sld xmlns:a="http://schemas.openxmlformats.org/drawingml/2006/main" xmlns:r="http://schemas.openxmlformats.org/officeDocument/2006/relationships" xmlns:p="http://schemas.openxmlformats.org/presentationml/2006/main">
-  <p:cSld>
-    <p:spTree>
-      <p:nvGrpSpPr>
-        <p:cNvPr id="1" name=""/>
-        <p:cNvGrpSpPr/>
-        <p:nvPr/>
-      </p:nvGrpSpPr>
-      <p:grpSpPr>
-        <a:xfrm>
-          <a:off x="0" y="0"/>
-          <a:ext cx="0" cy="0"/>
-          <a:chOff x="0" y="0"/>
-          <a:chExt cx="0" cy="0"/>
-        </a:xfrm>
-      </p:grpSpPr>
-      <p:sp>
-        <p:nvSpPr>
-          <p:cNvPr id="2" name="Title 1"/>
-          <p:cNvSpPr>
-            <a:spLocks noGrp="1"/>
-          </p:cNvSpPr>
-          <p:nvPr>
-            <p:ph type="title"/>
-          </p:nvPr>
-        </p:nvSpPr>
-        <p:spPr/>
-        <p:txBody>
-          <a:bodyPr/>
-          <a:lstStyle/>
-          <a:p>
-            <a:r>
-              <a:rPr lang="en-US" dirty="0" smtClean="0"/>
-              <a:t>Class Diagram</a:t>
-            </a:r>
-            <a:endParaRPr lang="en-US" dirty="0"/>
-          </a:p>
-        </p:txBody>
-      </p:sp>
-      <p:pic>
-        <p:nvPicPr>
-          <p:cNvPr id="1026" name="Picture 2" descr="C:\Users\X230s\workspace\library-management\docs\LibrarySystem_ClassDiagram.png"/>
-          <p:cNvPicPr>
-            <a:picLocks noChangeAspect="1" noChangeArrowheads="1"/>
-          </p:cNvPicPr>
-          <p:nvPr/>
-        </p:nvPicPr>
-        <p:blipFill>
-          <a:blip r:embed="rId2"/>
-          <a:srcRect/>
-          <a:stretch>
-            <a:fillRect/>
-          </a:stretch>
-        </p:blipFill>
-        <p:spPr bwMode="auto">
-          <a:xfrm>
-            <a:off x="1143001" y="1295400"/>
-            <a:ext cx="7696200" cy="3691993"/>
-          </a:xfrm>
-          <a:prstGeom prst="rect">
-            <a:avLst/>
-          </a:prstGeom>
-          <a:noFill/>
-        </p:spPr>
-      </p:pic>
-    </p:spTree>
-  </p:cSld>
-  <p:clrMapOvr>
-    <a:masterClrMapping/>
-  </p:clrMapOvr>
-  <p:timing>
-    <p:tnLst>
-      <p:par>
-        <p:cTn id="1" dur="indefinite" restart="never" nodeType="tmRoot"/>
-      </p:par>
-    </p:tnLst>
-  </p:timing>
-</p:sld>
-</file>
-
-<file path=ppt/slides/slide3.xml><?xml version="1.0" encoding="utf-8"?>
-<p:sld xmlns:a="http://schemas.openxmlformats.org/drawingml/2006/main" xmlns:r="http://schemas.openxmlformats.org/officeDocument/2006/relationships" xmlns:p="http://schemas.openxmlformats.org/presentationml/2006/main">
-  <p:cSld>
-    <p:spTree>
-      <p:nvGrpSpPr>
-        <p:cNvPr id="1" name=""/>
-        <p:cNvGrpSpPr/>
-        <p:nvPr/>
-      </p:nvGrpSpPr>
-      <p:grpSpPr>
-        <a:xfrm>
-          <a:off x="0" y="0"/>
-          <a:ext cx="0" cy="0"/>
-          <a:chOff x="0" y="0"/>
-          <a:chExt cx="0" cy="0"/>
-        </a:xfrm>
-      </p:grpSpPr>
-      <p:sp>
-        <p:nvSpPr>
-          <p:cNvPr id="2" name="Title 1"/>
-          <p:cNvSpPr>
-            <a:spLocks noGrp="1"/>
-          </p:cNvSpPr>
-          <p:nvPr>
-            <p:ph type="title"/>
-          </p:nvPr>
-        </p:nvSpPr>
-        <p:spPr/>
-        <p:txBody>
-          <a:bodyPr/>
-          <a:lstStyle/>
-          <a:p>
-            <a:r>
-              <a:rPr lang="en-US" dirty="0" smtClean="0"/>
-              <a:t>Sequence Diagram - Login</a:t>
-            </a:r>
-            <a:endParaRPr lang="en-US" dirty="0"/>
-          </a:p>
-        </p:txBody>
-      </p:sp>
-      <p:pic>
-        <p:nvPicPr>
-          <p:cNvPr id="2050" name="Picture 2" descr="C:\Users\X230s\workspace\library-management\docs\Login.png"/>
-          <p:cNvPicPr>
-            <a:picLocks noChangeAspect="1" noChangeArrowheads="1"/>
-          </p:cNvPicPr>
-          <p:nvPr/>
-        </p:nvPicPr>
-        <p:blipFill>
-          <a:blip r:embed="rId2"/>
-          <a:srcRect/>
-          <a:stretch>
-            <a:fillRect/>
-          </a:stretch>
-        </p:blipFill>
-        <p:spPr bwMode="auto">
-          <a:xfrm>
-            <a:off x="1143000" y="1560149"/>
-            <a:ext cx="7720748" cy="3926251"/>
-          </a:xfrm>
-          <a:prstGeom prst="rect">
-            <a:avLst/>
-          </a:prstGeom>
-          <a:noFill/>
-        </p:spPr>
-      </p:pic>
-    </p:spTree>
-  </p:cSld>
-  <p:clrMapOvr>
-    <a:masterClrMapping/>
-  </p:clrMapOvr>
-  <p:timing>
-    <p:tnLst>
-      <p:par>
-        <p:cTn id="1" dur="indefinite" restart="never" nodeType="tmRoot"/>
-      </p:par>
-    </p:tnLst>
-  </p:timing>
-</p:sld>
-</file>
-
-<file path=ppt/slides/slide4.xml><?xml version="1.0" encoding="utf-8"?>
-<p:sld xmlns:a="http://schemas.openxmlformats.org/drawingml/2006/main" xmlns:r="http://schemas.openxmlformats.org/officeDocument/2006/relationships" xmlns:p="http://schemas.openxmlformats.org/presentationml/2006/main">
-  <p:cSld>
-    <p:spTree>
-      <p:nvGrpSpPr>
-        <p:cNvPr id="1" name=""/>
-        <p:cNvGrpSpPr/>
-        <p:nvPr/>
-      </p:nvGrpSpPr>
-      <p:grpSpPr>
-        <a:xfrm>
-          <a:off x="0" y="0"/>
-          <a:ext cx="0" cy="0"/>
-          <a:chOff x="0" y="0"/>
-          <a:chExt cx="0" cy="0"/>
-        </a:xfrm>
-      </p:grpSpPr>
-      <p:sp>
-        <p:nvSpPr>
-          <p:cNvPr id="2" name="Title 1"/>
-          <p:cNvSpPr>
-            <a:spLocks noGrp="1"/>
-          </p:cNvSpPr>
-          <p:nvPr>
-            <p:ph type="title"/>
-          </p:nvPr>
-        </p:nvSpPr>
-        <p:spPr/>
-        <p:txBody>
-          <a:bodyPr>
-            <a:normAutofit fontScale="90000"/>
-          </a:bodyPr>
-          <a:lstStyle/>
-          <a:p>
-            <a:r>
-              <a:rPr lang="en-US" dirty="0" smtClean="0"/>
-              <a:t>Sequence Diagram – Add New Library Member</a:t>
-            </a:r>
-            <a:endParaRPr lang="en-US" dirty="0"/>
-          </a:p>
-        </p:txBody>
-      </p:sp>
-      <p:pic>
-        <p:nvPicPr>
-          <p:cNvPr id="3074" name="Picture 2" descr="C:\Users\X230s\workspace\library-management\docs\AddNewLibraryMember.png"/>
-          <p:cNvPicPr>
-            <a:picLocks noChangeAspect="1" noChangeArrowheads="1"/>
-          </p:cNvPicPr>
-          <p:nvPr/>
-        </p:nvPicPr>
-        <p:blipFill>
-          <a:blip r:embed="rId2"/>
-          <a:srcRect/>
-          <a:stretch>
-            <a:fillRect/>
-          </a:stretch>
-        </p:blipFill>
-        <p:spPr bwMode="auto">
-          <a:xfrm>
-            <a:off x="1066801" y="1676400"/>
-            <a:ext cx="7848600" cy="4262348"/>
-          </a:xfrm>
-          <a:prstGeom prst="rect">
-            <a:avLst/>
-          </a:prstGeom>
-          <a:noFill/>
-        </p:spPr>
-      </p:pic>
-    </p:spTree>
-  </p:cSld>
-  <p:clrMapOvr>
-    <a:masterClrMapping/>
-  </p:clrMapOvr>
-  <p:timing>
-    <p:tnLst>
-      <p:par>
-        <p:cTn id="1" dur="indefinite" restart="never" nodeType="tmRoot"/>
-      </p:par>
-    </p:tnLst>
-  </p:timing>
-</p:sld>
-</file>
-
-<file path=ppt/slides/slide5.xml><?xml version="1.0" encoding="utf-8"?>
-<p:sld xmlns:a="http://schemas.openxmlformats.org/drawingml/2006/main" xmlns:r="http://schemas.openxmlformats.org/officeDocument/2006/relationships" xmlns:p="http://schemas.openxmlformats.org/presentationml/2006/main">
-  <p:cSld>
-    <p:spTree>
-      <p:nvGrpSpPr>
-        <p:cNvPr id="1" name=""/>
-        <p:cNvGrpSpPr/>
-        <p:nvPr/>
-      </p:nvGrpSpPr>
-      <p:grpSpPr>
-        <a:xfrm>
-          <a:off x="0" y="0"/>
-          <a:ext cx="0" cy="0"/>
-          <a:chOff x="0" y="0"/>
-          <a:chExt cx="0" cy="0"/>
-        </a:xfrm>
-      </p:grpSpPr>
-      <p:sp>
-        <p:nvSpPr>
-          <p:cNvPr id="2" name="Title 1"/>
-          <p:cNvSpPr>
-            <a:spLocks noGrp="1"/>
-          </p:cNvSpPr>
-          <p:nvPr>
-            <p:ph type="title"/>
-          </p:nvPr>
-        </p:nvSpPr>
-        <p:spPr/>
-        <p:txBody>
-          <a:bodyPr>
-            <a:normAutofit fontScale="90000"/>
-          </a:bodyPr>
-          <a:lstStyle/>
-          <a:p>
-            <a:r>
-              <a:rPr lang="en-US" dirty="0" smtClean="0"/>
-              <a:t>Sequence Diagram – </a:t>
-            </a:r>
-            <a:r>
-              <a:rPr lang="en-US" dirty="0" smtClean="0"/>
-              <a:t>Edit</a:t>
-            </a:r>
-            <a:r>
-              <a:rPr lang="en-US" dirty="0" smtClean="0"/>
-              <a:t> </a:t>
-            </a:r>
-            <a:r>
-              <a:rPr lang="en-US" dirty="0" smtClean="0"/>
-              <a:t>New Library Member</a:t>
-            </a:r>
-            <a:endParaRPr lang="en-US" dirty="0"/>
-          </a:p>
-        </p:txBody>
-      </p:sp>
-      <p:pic>
-        <p:nvPicPr>
-          <p:cNvPr id="4098" name="Picture 2" descr="C:\Users\X230s\workspace\library-management\docs\EditLibraryMember.png"/>
-          <p:cNvPicPr>
-            <a:picLocks noChangeAspect="1" noChangeArrowheads="1"/>
-          </p:cNvPicPr>
-          <p:nvPr/>
-        </p:nvPicPr>
-        <p:blipFill>
-          <a:blip r:embed="rId2"/>
-          <a:srcRect/>
-          <a:stretch>
-            <a:fillRect/>
-          </a:stretch>
-        </p:blipFill>
-        <p:spPr bwMode="auto">
-          <a:xfrm>
-            <a:off x="1066800" y="1905000"/>
-            <a:ext cx="7922961" cy="4343400"/>
-          </a:xfrm>
-          <a:prstGeom prst="rect">
-            <a:avLst/>
-          </a:prstGeom>
-          <a:noFill/>
-        </p:spPr>
-      </p:pic>
-    </p:spTree>
-  </p:cSld>
-  <p:clrMapOvr>
-    <a:masterClrMapping/>
-  </p:clrMapOvr>
-  <p:timing>
-    <p:tnLst>
-      <p:par>
-        <p:cTn id="1" dur="indefinite" restart="never" nodeType="tmRoot"/>
-      </p:par>
-    </p:tnLst>
-  </p:timing>
-</p:sld>
-</file>
-
-<file path=ppt/slides/slide6.xml><?xml version="1.0" encoding="utf-8"?>
-<p:sld xmlns:a="http://schemas.openxmlformats.org/drawingml/2006/main" xmlns:r="http://schemas.openxmlformats.org/officeDocument/2006/relationships" xmlns:p="http://schemas.openxmlformats.org/presentationml/2006/main">
-  <p:cSld>
-    <p:spTree>
-      <p:nvGrpSpPr>
-        <p:cNvPr id="1" name=""/>
-        <p:cNvGrpSpPr/>
-        <p:nvPr/>
-      </p:nvGrpSpPr>
-      <p:grpSpPr>
-        <a:xfrm>
-          <a:off x="0" y="0"/>
-          <a:ext cx="0" cy="0"/>
-          <a:chOff x="0" y="0"/>
-          <a:chExt cx="0" cy="0"/>
-        </a:xfrm>
-      </p:grpSpPr>
-      <p:sp>
-        <p:nvSpPr>
-          <p:cNvPr id="2" name="Title 1"/>
-          <p:cNvSpPr>
-            <a:spLocks noGrp="1"/>
-          </p:cNvSpPr>
-          <p:nvPr>
-            <p:ph type="title"/>
-          </p:nvPr>
-        </p:nvSpPr>
-        <p:spPr/>
-        <p:txBody>
-          <a:bodyPr>
-            <a:normAutofit/>
-          </a:bodyPr>
-          <a:lstStyle/>
-          <a:p>
-            <a:r>
-              <a:rPr lang="en-US" dirty="0" smtClean="0"/>
-              <a:t>Sequence Diagram – Add Book</a:t>
-            </a:r>
-            <a:endParaRPr lang="en-US" dirty="0"/>
-          </a:p>
-        </p:txBody>
-      </p:sp>
-      <p:pic>
-        <p:nvPicPr>
-          <p:cNvPr id="5122" name="Picture 2" descr="C:\Users\X230s\workspace\library-management\docs\AddBook.png"/>
-          <p:cNvPicPr>
-            <a:picLocks noChangeAspect="1" noChangeArrowheads="1"/>
-          </p:cNvPicPr>
-          <p:nvPr/>
-        </p:nvPicPr>
-        <p:blipFill>
-          <a:blip r:embed="rId2"/>
-          <a:srcRect/>
-          <a:stretch>
-            <a:fillRect/>
-          </a:stretch>
-        </p:blipFill>
-        <p:spPr bwMode="auto">
-          <a:xfrm>
-            <a:off x="1295400" y="1447800"/>
-            <a:ext cx="7620000" cy="4911576"/>
-          </a:xfrm>
-          <a:prstGeom prst="rect">
-            <a:avLst/>
-          </a:prstGeom>
-          <a:noFill/>
-        </p:spPr>
-      </p:pic>
-    </p:spTree>
-  </p:cSld>
-  <p:clrMapOvr>
-    <a:masterClrMapping/>
-  </p:clrMapOvr>
-  <p:timing>
-    <p:tnLst>
-      <p:par>
-        <p:cTn id="1" dur="indefinite" restart="never" nodeType="tmRoot"/>
-      </p:par>
-    </p:tnLst>
-  </p:timing>
-</p:sld>
-</file>
-
-<file path=ppt/slides/slide7.xml><?xml version="1.0" encoding="utf-8"?>
+<file path=ppt/slides/slide11.xml><?xml version="1.0" encoding="utf-8"?>
 <p:sld xmlns:a="http://schemas.openxmlformats.org/drawingml/2006/main" xmlns:r="http://schemas.openxmlformats.org/officeDocument/2006/relationships" xmlns:p="http://schemas.openxmlformats.org/presentationml/2006/main">
   <p:cSld>
     <p:spTree>
@@ -4877,7 +4517,7 @@
 </p:sld>
 </file>
 
-<file path=ppt/slides/slide8.xml><?xml version="1.0" encoding="utf-8"?>
+<file path=ppt/slides/slide12.xml><?xml version="1.0" encoding="utf-8"?>
 <p:sld xmlns:a="http://schemas.openxmlformats.org/drawingml/2006/main" xmlns:r="http://schemas.openxmlformats.org/officeDocument/2006/relationships" xmlns:p="http://schemas.openxmlformats.org/presentationml/2006/main">
   <p:cSld>
     <p:spTree>
@@ -4907,37 +4547,77 @@
         <p:spPr/>
         <p:txBody>
           <a:bodyPr>
-            <a:normAutofit fontScale="90000"/>
+            <a:normAutofit/>
           </a:bodyPr>
           <a:lstStyle/>
           <a:p>
             <a:r>
               <a:rPr lang="en-US" dirty="0" smtClean="0"/>
-              <a:t>Sequence Diagram – Check Out Book</a:t>
+              <a:t>Screen Shot – Add Book Copy</a:t>
             </a:r>
             <a:endParaRPr lang="en-US" dirty="0"/>
           </a:p>
         </p:txBody>
       </p:sp>
-      <p:sp>
-        <p:nvSpPr>
-          <p:cNvPr id="3" name="Content Placeholder 2"/>
-          <p:cNvSpPr>
-            <a:spLocks noGrp="1"/>
-          </p:cNvSpPr>
-          <p:nvPr>
-            <p:ph idx="1"/>
-          </p:nvPr>
-        </p:nvSpPr>
-        <p:spPr/>
-        <p:txBody>
-          <a:bodyPr/>
-          <a:lstStyle/>
-          <a:p>
-            <a:endParaRPr lang="en-US"/>
-          </a:p>
-        </p:txBody>
-      </p:sp>
+      <p:pic>
+        <p:nvPicPr>
+          <p:cNvPr id="5122" name="Picture 2" descr="C:\Users\X230s\Google Drive\MUM\MPP\Project\docs\addbookcopy.png"/>
+          <p:cNvPicPr>
+            <a:picLocks noChangeAspect="1" noChangeArrowheads="1"/>
+          </p:cNvPicPr>
+          <p:nvPr/>
+        </p:nvPicPr>
+        <p:blipFill>
+          <a:blip r:embed="rId2"/>
+          <a:srcRect/>
+          <a:stretch>
+            <a:fillRect/>
+          </a:stretch>
+        </p:blipFill>
+        <p:spPr bwMode="auto">
+          <a:xfrm>
+            <a:off x="228600" y="1295401"/>
+            <a:ext cx="4217538" cy="2819400"/>
+          </a:xfrm>
+          <a:prstGeom prst="rect">
+            <a:avLst/>
+          </a:prstGeom>
+          <a:noFill/>
+        </p:spPr>
+      </p:pic>
+      <p:pic>
+        <p:nvPicPr>
+          <p:cNvPr id="5123" name="Picture 3"/>
+          <p:cNvPicPr>
+            <a:picLocks noChangeAspect="1" noChangeArrowheads="1"/>
+          </p:cNvPicPr>
+          <p:nvPr/>
+        </p:nvPicPr>
+        <p:blipFill>
+          <a:blip r:embed="rId3"/>
+          <a:srcRect/>
+          <a:stretch>
+            <a:fillRect/>
+          </a:stretch>
+        </p:blipFill>
+        <p:spPr bwMode="auto">
+          <a:xfrm>
+            <a:off x="3505200" y="4191000"/>
+            <a:ext cx="4724400" cy="2196015"/>
+          </a:xfrm>
+          <a:prstGeom prst="rect">
+            <a:avLst/>
+          </a:prstGeom>
+          <a:noFill/>
+          <a:ln w="9525">
+            <a:noFill/>
+            <a:miter lim="800000"/>
+            <a:headEnd/>
+            <a:tailEnd/>
+          </a:ln>
+          <a:effectLst/>
+        </p:spPr>
+      </p:pic>
     </p:spTree>
   </p:cSld>
   <p:clrMapOvr>
@@ -4953,7 +4633,83 @@
 </p:sld>
 </file>
 
-<file path=ppt/slides/slide9.xml><?xml version="1.0" encoding="utf-8"?>
+<file path=ppt/slides/slide13.xml><?xml version="1.0" encoding="utf-8"?>
+<p:sld xmlns:a="http://schemas.openxmlformats.org/drawingml/2006/main" xmlns:r="http://schemas.openxmlformats.org/officeDocument/2006/relationships" xmlns:p="http://schemas.openxmlformats.org/presentationml/2006/main">
+  <p:cSld>
+    <p:spTree>
+      <p:nvGrpSpPr>
+        <p:cNvPr id="1" name=""/>
+        <p:cNvGrpSpPr/>
+        <p:nvPr/>
+      </p:nvGrpSpPr>
+      <p:grpSpPr>
+        <a:xfrm>
+          <a:off x="0" y="0"/>
+          <a:ext cx="0" cy="0"/>
+          <a:chOff x="0" y="0"/>
+          <a:chExt cx="0" cy="0"/>
+        </a:xfrm>
+      </p:grpSpPr>
+      <p:sp>
+        <p:nvSpPr>
+          <p:cNvPr id="2" name="Title 1"/>
+          <p:cNvSpPr>
+            <a:spLocks noGrp="1"/>
+          </p:cNvSpPr>
+          <p:nvPr>
+            <p:ph type="title"/>
+          </p:nvPr>
+        </p:nvSpPr>
+        <p:spPr/>
+        <p:txBody>
+          <a:bodyPr>
+            <a:normAutofit fontScale="90000"/>
+          </a:bodyPr>
+          <a:lstStyle/>
+          <a:p>
+            <a:r>
+              <a:rPr lang="en-US" dirty="0" smtClean="0"/>
+              <a:t>Sequence Diagram – Check Out Book</a:t>
+            </a:r>
+            <a:endParaRPr lang="en-US" dirty="0"/>
+          </a:p>
+        </p:txBody>
+      </p:sp>
+      <p:sp>
+        <p:nvSpPr>
+          <p:cNvPr id="3" name="Content Placeholder 2"/>
+          <p:cNvSpPr>
+            <a:spLocks noGrp="1"/>
+          </p:cNvSpPr>
+          <p:nvPr>
+            <p:ph idx="1"/>
+          </p:nvPr>
+        </p:nvSpPr>
+        <p:spPr/>
+        <p:txBody>
+          <a:bodyPr/>
+          <a:lstStyle/>
+          <a:p>
+            <a:endParaRPr lang="en-US"/>
+          </a:p>
+        </p:txBody>
+      </p:sp>
+    </p:spTree>
+  </p:cSld>
+  <p:clrMapOvr>
+    <a:masterClrMapping/>
+  </p:clrMapOvr>
+  <p:timing>
+    <p:tnLst>
+      <p:par>
+        <p:cTn id="1" dur="indefinite" restart="never" nodeType="tmRoot"/>
+      </p:par>
+    </p:tnLst>
+  </p:timing>
+</p:sld>
+</file>
+
+<file path=ppt/slides/slide14.xml><?xml version="1.0" encoding="utf-8"?>
 <p:sld xmlns:a="http://schemas.openxmlformats.org/drawingml/2006/main" xmlns:r="http://schemas.openxmlformats.org/officeDocument/2006/relationships" xmlns:p="http://schemas.openxmlformats.org/presentationml/2006/main">
   <p:cSld>
     <p:spTree>
@@ -4989,6 +4745,823 @@
           <a:xfrm>
             <a:off x="1066800" y="901381"/>
             <a:ext cx="7309358" cy="5270819"/>
+          </a:xfrm>
+          <a:prstGeom prst="rect">
+            <a:avLst/>
+          </a:prstGeom>
+          <a:noFill/>
+        </p:spPr>
+      </p:pic>
+    </p:spTree>
+  </p:cSld>
+  <p:clrMapOvr>
+    <a:masterClrMapping/>
+  </p:clrMapOvr>
+  <p:timing>
+    <p:tnLst>
+      <p:par>
+        <p:cTn id="1" dur="indefinite" restart="never" nodeType="tmRoot"/>
+      </p:par>
+    </p:tnLst>
+  </p:timing>
+</p:sld>
+</file>
+
+<file path=ppt/slides/slide15.xml><?xml version="1.0" encoding="utf-8"?>
+<p:sld xmlns:a="http://schemas.openxmlformats.org/drawingml/2006/main" xmlns:r="http://schemas.openxmlformats.org/officeDocument/2006/relationships" xmlns:p="http://schemas.openxmlformats.org/presentationml/2006/main">
+  <p:cSld>
+    <p:spTree>
+      <p:nvGrpSpPr>
+        <p:cNvPr id="1" name=""/>
+        <p:cNvGrpSpPr/>
+        <p:nvPr/>
+      </p:nvGrpSpPr>
+      <p:grpSpPr>
+        <a:xfrm>
+          <a:off x="0" y="0"/>
+          <a:ext cx="0" cy="0"/>
+          <a:chOff x="0" y="0"/>
+          <a:chExt cx="0" cy="0"/>
+        </a:xfrm>
+      </p:grpSpPr>
+      <p:pic>
+        <p:nvPicPr>
+          <p:cNvPr id="8194" name="Picture 2" descr="C:\Users\X230s\Downloads\hand-writes-the-word-thank-you_fyUln5HO.jpg"/>
+          <p:cNvPicPr>
+            <a:picLocks noChangeAspect="1" noChangeArrowheads="1"/>
+          </p:cNvPicPr>
+          <p:nvPr/>
+        </p:nvPicPr>
+        <p:blipFill>
+          <a:blip r:embed="rId2" cstate="print"/>
+          <a:srcRect/>
+          <a:stretch>
+            <a:fillRect/>
+          </a:stretch>
+        </p:blipFill>
+        <p:spPr bwMode="auto">
+          <a:xfrm>
+            <a:off x="1143000" y="838200"/>
+            <a:ext cx="7785906" cy="5191125"/>
+          </a:xfrm>
+          <a:prstGeom prst="rect">
+            <a:avLst/>
+          </a:prstGeom>
+          <a:noFill/>
+        </p:spPr>
+      </p:pic>
+    </p:spTree>
+  </p:cSld>
+  <p:clrMapOvr>
+    <a:masterClrMapping/>
+  </p:clrMapOvr>
+  <p:timing>
+    <p:tnLst>
+      <p:par>
+        <p:cTn id="1" dur="indefinite" restart="never" nodeType="tmRoot"/>
+      </p:par>
+    </p:tnLst>
+  </p:timing>
+</p:sld>
+</file>
+
+<file path=ppt/slides/slide2.xml><?xml version="1.0" encoding="utf-8"?>
+<p:sld xmlns:a="http://schemas.openxmlformats.org/drawingml/2006/main" xmlns:r="http://schemas.openxmlformats.org/officeDocument/2006/relationships" xmlns:p="http://schemas.openxmlformats.org/presentationml/2006/main">
+  <p:cSld>
+    <p:spTree>
+      <p:nvGrpSpPr>
+        <p:cNvPr id="1" name=""/>
+        <p:cNvGrpSpPr/>
+        <p:nvPr/>
+      </p:nvGrpSpPr>
+      <p:grpSpPr>
+        <a:xfrm>
+          <a:off x="0" y="0"/>
+          <a:ext cx="0" cy="0"/>
+          <a:chOff x="0" y="0"/>
+          <a:chExt cx="0" cy="0"/>
+        </a:xfrm>
+      </p:grpSpPr>
+      <p:sp>
+        <p:nvSpPr>
+          <p:cNvPr id="2" name="Title 1"/>
+          <p:cNvSpPr>
+            <a:spLocks noGrp="1"/>
+          </p:cNvSpPr>
+          <p:nvPr>
+            <p:ph type="title"/>
+          </p:nvPr>
+        </p:nvSpPr>
+        <p:spPr/>
+        <p:txBody>
+          <a:bodyPr/>
+          <a:lstStyle/>
+          <a:p>
+            <a:r>
+              <a:rPr lang="en-US" dirty="0" smtClean="0"/>
+              <a:t>Class Diagram</a:t>
+            </a:r>
+            <a:endParaRPr lang="en-US" dirty="0"/>
+          </a:p>
+        </p:txBody>
+      </p:sp>
+      <p:pic>
+        <p:nvPicPr>
+          <p:cNvPr id="1026" name="Picture 2" descr="C:\Users\X230s\workspace\library-management\docs\LibrarySystem_ClassDiagram.png"/>
+          <p:cNvPicPr>
+            <a:picLocks noChangeAspect="1" noChangeArrowheads="1"/>
+          </p:cNvPicPr>
+          <p:nvPr/>
+        </p:nvPicPr>
+        <p:blipFill>
+          <a:blip r:embed="rId2"/>
+          <a:srcRect/>
+          <a:stretch>
+            <a:fillRect/>
+          </a:stretch>
+        </p:blipFill>
+        <p:spPr bwMode="auto">
+          <a:xfrm>
+            <a:off x="1143001" y="1295400"/>
+            <a:ext cx="7696200" cy="3691993"/>
+          </a:xfrm>
+          <a:prstGeom prst="rect">
+            <a:avLst/>
+          </a:prstGeom>
+          <a:noFill/>
+        </p:spPr>
+      </p:pic>
+    </p:spTree>
+  </p:cSld>
+  <p:clrMapOvr>
+    <a:masterClrMapping/>
+  </p:clrMapOvr>
+  <p:timing>
+    <p:tnLst>
+      <p:par>
+        <p:cTn id="1" dur="indefinite" restart="never" nodeType="tmRoot"/>
+      </p:par>
+    </p:tnLst>
+  </p:timing>
+</p:sld>
+</file>
+
+<file path=ppt/slides/slide3.xml><?xml version="1.0" encoding="utf-8"?>
+<p:sld xmlns:a="http://schemas.openxmlformats.org/drawingml/2006/main" xmlns:r="http://schemas.openxmlformats.org/officeDocument/2006/relationships" xmlns:p="http://schemas.openxmlformats.org/presentationml/2006/main">
+  <p:cSld>
+    <p:spTree>
+      <p:nvGrpSpPr>
+        <p:cNvPr id="1" name=""/>
+        <p:cNvGrpSpPr/>
+        <p:nvPr/>
+      </p:nvGrpSpPr>
+      <p:grpSpPr>
+        <a:xfrm>
+          <a:off x="0" y="0"/>
+          <a:ext cx="0" cy="0"/>
+          <a:chOff x="0" y="0"/>
+          <a:chExt cx="0" cy="0"/>
+        </a:xfrm>
+      </p:grpSpPr>
+      <p:sp>
+        <p:nvSpPr>
+          <p:cNvPr id="2" name="Title 1"/>
+          <p:cNvSpPr>
+            <a:spLocks noGrp="1"/>
+          </p:cNvSpPr>
+          <p:nvPr>
+            <p:ph type="title"/>
+          </p:nvPr>
+        </p:nvSpPr>
+        <p:spPr/>
+        <p:txBody>
+          <a:bodyPr/>
+          <a:lstStyle/>
+          <a:p>
+            <a:r>
+              <a:rPr lang="en-US" dirty="0" smtClean="0"/>
+              <a:t>Sequence Diagram - Login</a:t>
+            </a:r>
+            <a:endParaRPr lang="en-US" dirty="0"/>
+          </a:p>
+        </p:txBody>
+      </p:sp>
+      <p:pic>
+        <p:nvPicPr>
+          <p:cNvPr id="2050" name="Picture 2" descr="C:\Users\X230s\workspace\library-management\docs\Login.png"/>
+          <p:cNvPicPr>
+            <a:picLocks noChangeAspect="1" noChangeArrowheads="1"/>
+          </p:cNvPicPr>
+          <p:nvPr/>
+        </p:nvPicPr>
+        <p:blipFill>
+          <a:blip r:embed="rId2"/>
+          <a:srcRect/>
+          <a:stretch>
+            <a:fillRect/>
+          </a:stretch>
+        </p:blipFill>
+        <p:spPr bwMode="auto">
+          <a:xfrm>
+            <a:off x="1143000" y="1560149"/>
+            <a:ext cx="7720748" cy="3926251"/>
+          </a:xfrm>
+          <a:prstGeom prst="rect">
+            <a:avLst/>
+          </a:prstGeom>
+          <a:noFill/>
+        </p:spPr>
+      </p:pic>
+    </p:spTree>
+  </p:cSld>
+  <p:clrMapOvr>
+    <a:masterClrMapping/>
+  </p:clrMapOvr>
+  <p:timing>
+    <p:tnLst>
+      <p:par>
+        <p:cTn id="1" dur="indefinite" restart="never" nodeType="tmRoot"/>
+      </p:par>
+    </p:tnLst>
+  </p:timing>
+</p:sld>
+</file>
+
+<file path=ppt/slides/slide4.xml><?xml version="1.0" encoding="utf-8"?>
+<p:sld xmlns:a="http://schemas.openxmlformats.org/drawingml/2006/main" xmlns:r="http://schemas.openxmlformats.org/officeDocument/2006/relationships" xmlns:p="http://schemas.openxmlformats.org/presentationml/2006/main">
+  <p:cSld>
+    <p:spTree>
+      <p:nvGrpSpPr>
+        <p:cNvPr id="1" name=""/>
+        <p:cNvGrpSpPr/>
+        <p:nvPr/>
+      </p:nvGrpSpPr>
+      <p:grpSpPr>
+        <a:xfrm>
+          <a:off x="0" y="0"/>
+          <a:ext cx="0" cy="0"/>
+          <a:chOff x="0" y="0"/>
+          <a:chExt cx="0" cy="0"/>
+        </a:xfrm>
+      </p:grpSpPr>
+      <p:sp>
+        <p:nvSpPr>
+          <p:cNvPr id="2" name="Title 1"/>
+          <p:cNvSpPr>
+            <a:spLocks noGrp="1"/>
+          </p:cNvSpPr>
+          <p:nvPr>
+            <p:ph type="title"/>
+          </p:nvPr>
+        </p:nvSpPr>
+        <p:spPr/>
+        <p:txBody>
+          <a:bodyPr>
+            <a:normAutofit/>
+          </a:bodyPr>
+          <a:lstStyle/>
+          <a:p>
+            <a:r>
+              <a:rPr lang="en-US" dirty="0" smtClean="0"/>
+              <a:t>Screen Shot - Login</a:t>
+            </a:r>
+            <a:endParaRPr lang="en-US" dirty="0"/>
+          </a:p>
+        </p:txBody>
+      </p:sp>
+      <p:pic>
+        <p:nvPicPr>
+          <p:cNvPr id="1026" name="Picture 2" descr="C:\Users\X230s\Google Drive\MUM\MPP\Project\docs\Login.png"/>
+          <p:cNvPicPr>
+            <a:picLocks noChangeAspect="1" noChangeArrowheads="1"/>
+          </p:cNvPicPr>
+          <p:nvPr/>
+        </p:nvPicPr>
+        <p:blipFill>
+          <a:blip r:embed="rId2"/>
+          <a:srcRect/>
+          <a:stretch>
+            <a:fillRect/>
+          </a:stretch>
+        </p:blipFill>
+        <p:spPr bwMode="auto">
+          <a:xfrm>
+            <a:off x="1447800" y="1219200"/>
+            <a:ext cx="3228189" cy="3581400"/>
+          </a:xfrm>
+          <a:prstGeom prst="rect">
+            <a:avLst/>
+          </a:prstGeom>
+          <a:noFill/>
+        </p:spPr>
+      </p:pic>
+      <p:pic>
+        <p:nvPicPr>
+          <p:cNvPr id="1027" name="Picture 3"/>
+          <p:cNvPicPr>
+            <a:picLocks noChangeAspect="1" noChangeArrowheads="1"/>
+          </p:cNvPicPr>
+          <p:nvPr/>
+        </p:nvPicPr>
+        <p:blipFill>
+          <a:blip r:embed="rId3"/>
+          <a:srcRect/>
+          <a:stretch>
+            <a:fillRect/>
+          </a:stretch>
+        </p:blipFill>
+        <p:spPr bwMode="auto">
+          <a:xfrm>
+            <a:off x="4953000" y="3650242"/>
+            <a:ext cx="4191000" cy="2788658"/>
+          </a:xfrm>
+          <a:prstGeom prst="rect">
+            <a:avLst/>
+          </a:prstGeom>
+          <a:noFill/>
+          <a:ln w="9525">
+            <a:noFill/>
+            <a:miter lim="800000"/>
+            <a:headEnd/>
+            <a:tailEnd/>
+          </a:ln>
+          <a:effectLst/>
+        </p:spPr>
+      </p:pic>
+    </p:spTree>
+  </p:cSld>
+  <p:clrMapOvr>
+    <a:masterClrMapping/>
+  </p:clrMapOvr>
+  <p:timing>
+    <p:tnLst>
+      <p:par>
+        <p:cTn id="1" dur="indefinite" restart="never" nodeType="tmRoot"/>
+      </p:par>
+    </p:tnLst>
+  </p:timing>
+</p:sld>
+</file>
+
+<file path=ppt/slides/slide5.xml><?xml version="1.0" encoding="utf-8"?>
+<p:sld xmlns:a="http://schemas.openxmlformats.org/drawingml/2006/main" xmlns:r="http://schemas.openxmlformats.org/officeDocument/2006/relationships" xmlns:p="http://schemas.openxmlformats.org/presentationml/2006/main">
+  <p:cSld>
+    <p:spTree>
+      <p:nvGrpSpPr>
+        <p:cNvPr id="1" name=""/>
+        <p:cNvGrpSpPr/>
+        <p:nvPr/>
+      </p:nvGrpSpPr>
+      <p:grpSpPr>
+        <a:xfrm>
+          <a:off x="0" y="0"/>
+          <a:ext cx="0" cy="0"/>
+          <a:chOff x="0" y="0"/>
+          <a:chExt cx="0" cy="0"/>
+        </a:xfrm>
+      </p:grpSpPr>
+      <p:sp>
+        <p:nvSpPr>
+          <p:cNvPr id="2" name="Title 1"/>
+          <p:cNvSpPr>
+            <a:spLocks noGrp="1"/>
+          </p:cNvSpPr>
+          <p:nvPr>
+            <p:ph type="title"/>
+          </p:nvPr>
+        </p:nvSpPr>
+        <p:spPr/>
+        <p:txBody>
+          <a:bodyPr>
+            <a:normAutofit fontScale="90000"/>
+          </a:bodyPr>
+          <a:lstStyle/>
+          <a:p>
+            <a:r>
+              <a:rPr lang="en-US" dirty="0" smtClean="0"/>
+              <a:t>Sequence Diagram – Add New Library Member</a:t>
+            </a:r>
+            <a:endParaRPr lang="en-US" dirty="0"/>
+          </a:p>
+        </p:txBody>
+      </p:sp>
+      <p:pic>
+        <p:nvPicPr>
+          <p:cNvPr id="3074" name="Picture 2" descr="C:\Users\X230s\workspace\library-management\docs\AddNewLibraryMember.png"/>
+          <p:cNvPicPr>
+            <a:picLocks noChangeAspect="1" noChangeArrowheads="1"/>
+          </p:cNvPicPr>
+          <p:nvPr/>
+        </p:nvPicPr>
+        <p:blipFill>
+          <a:blip r:embed="rId2"/>
+          <a:srcRect/>
+          <a:stretch>
+            <a:fillRect/>
+          </a:stretch>
+        </p:blipFill>
+        <p:spPr bwMode="auto">
+          <a:xfrm>
+            <a:off x="1066801" y="1676400"/>
+            <a:ext cx="7848600" cy="4262348"/>
+          </a:xfrm>
+          <a:prstGeom prst="rect">
+            <a:avLst/>
+          </a:prstGeom>
+          <a:noFill/>
+        </p:spPr>
+      </p:pic>
+    </p:spTree>
+  </p:cSld>
+  <p:clrMapOvr>
+    <a:masterClrMapping/>
+  </p:clrMapOvr>
+  <p:timing>
+    <p:tnLst>
+      <p:par>
+        <p:cTn id="1" dur="indefinite" restart="never" nodeType="tmRoot"/>
+      </p:par>
+    </p:tnLst>
+  </p:timing>
+</p:sld>
+</file>
+
+<file path=ppt/slides/slide6.xml><?xml version="1.0" encoding="utf-8"?>
+<p:sld xmlns:a="http://schemas.openxmlformats.org/drawingml/2006/main" xmlns:r="http://schemas.openxmlformats.org/officeDocument/2006/relationships" xmlns:p="http://schemas.openxmlformats.org/presentationml/2006/main">
+  <p:cSld>
+    <p:spTree>
+      <p:nvGrpSpPr>
+        <p:cNvPr id="1" name=""/>
+        <p:cNvGrpSpPr/>
+        <p:nvPr/>
+      </p:nvGrpSpPr>
+      <p:grpSpPr>
+        <a:xfrm>
+          <a:off x="0" y="0"/>
+          <a:ext cx="0" cy="0"/>
+          <a:chOff x="0" y="0"/>
+          <a:chExt cx="0" cy="0"/>
+        </a:xfrm>
+      </p:grpSpPr>
+      <p:sp>
+        <p:nvSpPr>
+          <p:cNvPr id="2" name="Title 1"/>
+          <p:cNvSpPr>
+            <a:spLocks noGrp="1"/>
+          </p:cNvSpPr>
+          <p:nvPr>
+            <p:ph type="title"/>
+          </p:nvPr>
+        </p:nvSpPr>
+        <p:spPr/>
+        <p:txBody>
+          <a:bodyPr>
+            <a:normAutofit fontScale="90000"/>
+          </a:bodyPr>
+          <a:lstStyle/>
+          <a:p>
+            <a:r>
+              <a:rPr lang="en-US" dirty="0" smtClean="0"/>
+              <a:t>Screen Shot – Add New Library Member</a:t>
+            </a:r>
+            <a:endParaRPr lang="en-US" dirty="0"/>
+          </a:p>
+        </p:txBody>
+      </p:sp>
+      <p:pic>
+        <p:nvPicPr>
+          <p:cNvPr id="2050" name="Picture 2" descr="C:\Users\X230s\Google Drive\MUM\MPP\Project\docs\addnewlibrarymember.png"/>
+          <p:cNvPicPr>
+            <a:picLocks noChangeAspect="1" noChangeArrowheads="1"/>
+          </p:cNvPicPr>
+          <p:nvPr/>
+        </p:nvPicPr>
+        <p:blipFill>
+          <a:blip r:embed="rId2"/>
+          <a:srcRect/>
+          <a:stretch>
+            <a:fillRect/>
+          </a:stretch>
+        </p:blipFill>
+        <p:spPr bwMode="auto">
+          <a:xfrm>
+            <a:off x="152400" y="1524000"/>
+            <a:ext cx="3962400" cy="2620837"/>
+          </a:xfrm>
+          <a:prstGeom prst="rect">
+            <a:avLst/>
+          </a:prstGeom>
+          <a:noFill/>
+        </p:spPr>
+      </p:pic>
+      <p:pic>
+        <p:nvPicPr>
+          <p:cNvPr id="2051" name="Picture 3"/>
+          <p:cNvPicPr>
+            <a:picLocks noChangeAspect="1" noChangeArrowheads="1"/>
+          </p:cNvPicPr>
+          <p:nvPr/>
+        </p:nvPicPr>
+        <p:blipFill>
+          <a:blip r:embed="rId3"/>
+          <a:srcRect/>
+          <a:stretch>
+            <a:fillRect/>
+          </a:stretch>
+        </p:blipFill>
+        <p:spPr bwMode="auto">
+          <a:xfrm>
+            <a:off x="4191001" y="3390286"/>
+            <a:ext cx="4953000" cy="3467714"/>
+          </a:xfrm>
+          <a:prstGeom prst="rect">
+            <a:avLst/>
+          </a:prstGeom>
+          <a:noFill/>
+          <a:ln w="9525">
+            <a:noFill/>
+            <a:miter lim="800000"/>
+            <a:headEnd/>
+            <a:tailEnd/>
+          </a:ln>
+          <a:effectLst/>
+        </p:spPr>
+      </p:pic>
+    </p:spTree>
+  </p:cSld>
+  <p:clrMapOvr>
+    <a:masterClrMapping/>
+  </p:clrMapOvr>
+  <p:timing>
+    <p:tnLst>
+      <p:par>
+        <p:cTn id="1" dur="indefinite" restart="never" nodeType="tmRoot"/>
+      </p:par>
+    </p:tnLst>
+  </p:timing>
+</p:sld>
+</file>
+
+<file path=ppt/slides/slide7.xml><?xml version="1.0" encoding="utf-8"?>
+<p:sld xmlns:a="http://schemas.openxmlformats.org/drawingml/2006/main" xmlns:r="http://schemas.openxmlformats.org/officeDocument/2006/relationships" xmlns:p="http://schemas.openxmlformats.org/presentationml/2006/main">
+  <p:cSld>
+    <p:spTree>
+      <p:nvGrpSpPr>
+        <p:cNvPr id="1" name=""/>
+        <p:cNvGrpSpPr/>
+        <p:nvPr/>
+      </p:nvGrpSpPr>
+      <p:grpSpPr>
+        <a:xfrm>
+          <a:off x="0" y="0"/>
+          <a:ext cx="0" cy="0"/>
+          <a:chOff x="0" y="0"/>
+          <a:chExt cx="0" cy="0"/>
+        </a:xfrm>
+      </p:grpSpPr>
+      <p:sp>
+        <p:nvSpPr>
+          <p:cNvPr id="2" name="Title 1"/>
+          <p:cNvSpPr>
+            <a:spLocks noGrp="1"/>
+          </p:cNvSpPr>
+          <p:nvPr>
+            <p:ph type="title"/>
+          </p:nvPr>
+        </p:nvSpPr>
+        <p:spPr/>
+        <p:txBody>
+          <a:bodyPr>
+            <a:normAutofit fontScale="90000"/>
+          </a:bodyPr>
+          <a:lstStyle/>
+          <a:p>
+            <a:r>
+              <a:rPr lang="en-US" dirty="0" smtClean="0"/>
+              <a:t>Sequence Diagram – Edit New Library Member</a:t>
+            </a:r>
+            <a:endParaRPr lang="en-US" dirty="0"/>
+          </a:p>
+        </p:txBody>
+      </p:sp>
+      <p:pic>
+        <p:nvPicPr>
+          <p:cNvPr id="4098" name="Picture 2" descr="C:\Users\X230s\workspace\library-management\docs\EditLibraryMember.png"/>
+          <p:cNvPicPr>
+            <a:picLocks noChangeAspect="1" noChangeArrowheads="1"/>
+          </p:cNvPicPr>
+          <p:nvPr/>
+        </p:nvPicPr>
+        <p:blipFill>
+          <a:blip r:embed="rId2"/>
+          <a:srcRect/>
+          <a:stretch>
+            <a:fillRect/>
+          </a:stretch>
+        </p:blipFill>
+        <p:spPr bwMode="auto">
+          <a:xfrm>
+            <a:off x="1066800" y="1905000"/>
+            <a:ext cx="7922961" cy="4343400"/>
+          </a:xfrm>
+          <a:prstGeom prst="rect">
+            <a:avLst/>
+          </a:prstGeom>
+          <a:noFill/>
+        </p:spPr>
+      </p:pic>
+    </p:spTree>
+  </p:cSld>
+  <p:clrMapOvr>
+    <a:masterClrMapping/>
+  </p:clrMapOvr>
+  <p:timing>
+    <p:tnLst>
+      <p:par>
+        <p:cTn id="1" dur="indefinite" restart="never" nodeType="tmRoot"/>
+      </p:par>
+    </p:tnLst>
+  </p:timing>
+</p:sld>
+</file>
+
+<file path=ppt/slides/slide8.xml><?xml version="1.0" encoding="utf-8"?>
+<p:sld xmlns:a="http://schemas.openxmlformats.org/drawingml/2006/main" xmlns:r="http://schemas.openxmlformats.org/officeDocument/2006/relationships" xmlns:p="http://schemas.openxmlformats.org/presentationml/2006/main">
+  <p:cSld>
+    <p:spTree>
+      <p:nvGrpSpPr>
+        <p:cNvPr id="1" name=""/>
+        <p:cNvGrpSpPr/>
+        <p:nvPr/>
+      </p:nvGrpSpPr>
+      <p:grpSpPr>
+        <a:xfrm>
+          <a:off x="0" y="0"/>
+          <a:ext cx="0" cy="0"/>
+          <a:chOff x="0" y="0"/>
+          <a:chExt cx="0" cy="0"/>
+        </a:xfrm>
+      </p:grpSpPr>
+      <p:sp>
+        <p:nvSpPr>
+          <p:cNvPr id="2" name="Title 1"/>
+          <p:cNvSpPr>
+            <a:spLocks noGrp="1"/>
+          </p:cNvSpPr>
+          <p:nvPr>
+            <p:ph type="title"/>
+          </p:nvPr>
+        </p:nvSpPr>
+        <p:spPr/>
+        <p:txBody>
+          <a:bodyPr>
+            <a:normAutofit fontScale="90000"/>
+          </a:bodyPr>
+          <a:lstStyle/>
+          <a:p>
+            <a:r>
+              <a:rPr lang="en-US" dirty="0" smtClean="0"/>
+              <a:t>Screen Shot – Edit Library Member Information</a:t>
+            </a:r>
+            <a:endParaRPr lang="en-US" dirty="0"/>
+          </a:p>
+        </p:txBody>
+      </p:sp>
+      <p:pic>
+        <p:nvPicPr>
+          <p:cNvPr id="4" name="Picture 3"/>
+          <p:cNvPicPr>
+            <a:picLocks noChangeAspect="1" noChangeArrowheads="1"/>
+          </p:cNvPicPr>
+          <p:nvPr/>
+        </p:nvPicPr>
+        <p:blipFill>
+          <a:blip r:embed="rId2"/>
+          <a:srcRect/>
+          <a:stretch>
+            <a:fillRect/>
+          </a:stretch>
+        </p:blipFill>
+        <p:spPr bwMode="auto">
+          <a:xfrm>
+            <a:off x="4191001" y="3390286"/>
+            <a:ext cx="4953000" cy="3467714"/>
+          </a:xfrm>
+          <a:prstGeom prst="rect">
+            <a:avLst/>
+          </a:prstGeom>
+          <a:noFill/>
+          <a:ln w="9525">
+            <a:noFill/>
+            <a:miter lim="800000"/>
+            <a:headEnd/>
+            <a:tailEnd/>
+          </a:ln>
+          <a:effectLst/>
+        </p:spPr>
+      </p:pic>
+      <p:pic>
+        <p:nvPicPr>
+          <p:cNvPr id="3074" name="Picture 2" descr="C:\Users\X230s\Google Drive\MUM\MPP\Project\docs\editmember.png"/>
+          <p:cNvPicPr>
+            <a:picLocks noChangeAspect="1" noChangeArrowheads="1"/>
+          </p:cNvPicPr>
+          <p:nvPr/>
+        </p:nvPicPr>
+        <p:blipFill>
+          <a:blip r:embed="rId3"/>
+          <a:srcRect/>
+          <a:stretch>
+            <a:fillRect/>
+          </a:stretch>
+        </p:blipFill>
+        <p:spPr bwMode="auto">
+          <a:xfrm>
+            <a:off x="304800" y="1371601"/>
+            <a:ext cx="4147400" cy="2743200"/>
+          </a:xfrm>
+          <a:prstGeom prst="rect">
+            <a:avLst/>
+          </a:prstGeom>
+          <a:noFill/>
+        </p:spPr>
+      </p:pic>
+    </p:spTree>
+  </p:cSld>
+  <p:clrMapOvr>
+    <a:masterClrMapping/>
+  </p:clrMapOvr>
+  <p:timing>
+    <p:tnLst>
+      <p:par>
+        <p:cTn id="1" dur="indefinite" restart="never" nodeType="tmRoot"/>
+      </p:par>
+    </p:tnLst>
+  </p:timing>
+</p:sld>
+</file>
+
+<file path=ppt/slides/slide9.xml><?xml version="1.0" encoding="utf-8"?>
+<p:sld xmlns:a="http://schemas.openxmlformats.org/drawingml/2006/main" xmlns:r="http://schemas.openxmlformats.org/officeDocument/2006/relationships" xmlns:p="http://schemas.openxmlformats.org/presentationml/2006/main">
+  <p:cSld>
+    <p:spTree>
+      <p:nvGrpSpPr>
+        <p:cNvPr id="1" name=""/>
+        <p:cNvGrpSpPr/>
+        <p:nvPr/>
+      </p:nvGrpSpPr>
+      <p:grpSpPr>
+        <a:xfrm>
+          <a:off x="0" y="0"/>
+          <a:ext cx="0" cy="0"/>
+          <a:chOff x="0" y="0"/>
+          <a:chExt cx="0" cy="0"/>
+        </a:xfrm>
+      </p:grpSpPr>
+      <p:sp>
+        <p:nvSpPr>
+          <p:cNvPr id="2" name="Title 1"/>
+          <p:cNvSpPr>
+            <a:spLocks noGrp="1"/>
+          </p:cNvSpPr>
+          <p:nvPr>
+            <p:ph type="title"/>
+          </p:nvPr>
+        </p:nvSpPr>
+        <p:spPr/>
+        <p:txBody>
+          <a:bodyPr>
+            <a:normAutofit/>
+          </a:bodyPr>
+          <a:lstStyle/>
+          <a:p>
+            <a:r>
+              <a:rPr lang="en-US" dirty="0" smtClean="0"/>
+              <a:t>Sequence Diagram – Add Book</a:t>
+            </a:r>
+            <a:endParaRPr lang="en-US" dirty="0"/>
+          </a:p>
+        </p:txBody>
+      </p:sp>
+      <p:pic>
+        <p:nvPicPr>
+          <p:cNvPr id="5122" name="Picture 2" descr="C:\Users\X230s\workspace\library-management\docs\AddBook.png"/>
+          <p:cNvPicPr>
+            <a:picLocks noChangeAspect="1" noChangeArrowheads="1"/>
+          </p:cNvPicPr>
+          <p:nvPr/>
+        </p:nvPicPr>
+        <p:blipFill>
+          <a:blip r:embed="rId2"/>
+          <a:srcRect/>
+          <a:stretch>
+            <a:fillRect/>
+          </a:stretch>
+        </p:blipFill>
+        <p:spPr bwMode="auto">
+          <a:xfrm>
+            <a:off x="1295400" y="1447800"/>
+            <a:ext cx="7620000" cy="4911576"/>
           </a:xfrm>
           <a:prstGeom prst="rect">
             <a:avLst/>

</xml_diff>

<commit_message>
remove backbutton in searchbook, updated the sequence diagrams and presentation slide
</commit_message>
<xml_diff>
--- a/docs/Library Management System.pptx
+++ b/docs/Library Management System.pptx
@@ -8,18 +8,22 @@
     <p:sldId id="257" r:id="rId2"/>
     <p:sldId id="258" r:id="rId3"/>
     <p:sldId id="266" r:id="rId4"/>
-    <p:sldId id="267" r:id="rId5"/>
-    <p:sldId id="259" r:id="rId6"/>
-    <p:sldId id="268" r:id="rId7"/>
-    <p:sldId id="260" r:id="rId8"/>
-    <p:sldId id="269" r:id="rId9"/>
-    <p:sldId id="261" r:id="rId10"/>
-    <p:sldId id="270" r:id="rId11"/>
-    <p:sldId id="262" r:id="rId12"/>
-    <p:sldId id="271" r:id="rId13"/>
-    <p:sldId id="265" r:id="rId14"/>
-    <p:sldId id="263" r:id="rId15"/>
-    <p:sldId id="264" r:id="rId16"/>
+    <p:sldId id="259" r:id="rId5"/>
+    <p:sldId id="260" r:id="rId6"/>
+    <p:sldId id="261" r:id="rId7"/>
+    <p:sldId id="262" r:id="rId8"/>
+    <p:sldId id="265" r:id="rId9"/>
+    <p:sldId id="277" r:id="rId10"/>
+    <p:sldId id="278" r:id="rId11"/>
+    <p:sldId id="272" r:id="rId12"/>
+    <p:sldId id="273" r:id="rId13"/>
+    <p:sldId id="274" r:id="rId14"/>
+    <p:sldId id="275" r:id="rId15"/>
+    <p:sldId id="276" r:id="rId16"/>
+    <p:sldId id="279" r:id="rId17"/>
+    <p:sldId id="280" r:id="rId18"/>
+    <p:sldId id="263" r:id="rId19"/>
+    <p:sldId id="264" r:id="rId20"/>
   </p:sldIdLst>
   <p:sldSz cx="9144000" cy="6858000" type="screen4x3"/>
   <p:notesSz cx="6858000" cy="9144000"/>
@@ -256,7 +260,7 @@
             <a:fld id="{8448BCA8-6BF2-45CA-B2FD-6B3DC378D7FF}" type="datetimeFigureOut">
               <a:rPr lang="en-US" smtClean="0"/>
               <a:pPr/>
-              <a:t>3/2/2016</a:t>
+              <a:t>3/3/2016</a:t>
             </a:fld>
             <a:endParaRPr lang="en-US"/>
           </a:p>
@@ -571,7 +575,7 @@
             <a:fld id="{8448BCA8-6BF2-45CA-B2FD-6B3DC378D7FF}" type="datetimeFigureOut">
               <a:rPr lang="en-US" smtClean="0"/>
               <a:pPr/>
-              <a:t>3/2/2016</a:t>
+              <a:t>3/3/2016</a:t>
             </a:fld>
             <a:endParaRPr lang="en-US"/>
           </a:p>
@@ -758,7 +762,7 @@
             <a:fld id="{8448BCA8-6BF2-45CA-B2FD-6B3DC378D7FF}" type="datetimeFigureOut">
               <a:rPr lang="en-US" smtClean="0"/>
               <a:pPr/>
-              <a:t>3/2/2016</a:t>
+              <a:t>3/3/2016</a:t>
             </a:fld>
             <a:endParaRPr lang="en-US"/>
           </a:p>
@@ -935,7 +939,7 @@
             <a:fld id="{8448BCA8-6BF2-45CA-B2FD-6B3DC378D7FF}" type="datetimeFigureOut">
               <a:rPr lang="en-US" smtClean="0"/>
               <a:pPr/>
-              <a:t>3/2/2016</a:t>
+              <a:t>3/3/2016</a:t>
             </a:fld>
             <a:endParaRPr lang="en-US"/>
           </a:p>
@@ -1205,7 +1209,7 @@
             <a:fld id="{8448BCA8-6BF2-45CA-B2FD-6B3DC378D7FF}" type="datetimeFigureOut">
               <a:rPr lang="en-US" smtClean="0"/>
               <a:pPr/>
-              <a:t>3/2/2016</a:t>
+              <a:t>3/3/2016</a:t>
             </a:fld>
             <a:endParaRPr lang="en-US"/>
           </a:p>
@@ -1675,7 +1679,7 @@
             <a:fld id="{8448BCA8-6BF2-45CA-B2FD-6B3DC378D7FF}" type="datetimeFigureOut">
               <a:rPr lang="en-US" smtClean="0"/>
               <a:pPr/>
-              <a:t>3/2/2016</a:t>
+              <a:t>3/3/2016</a:t>
             </a:fld>
             <a:endParaRPr lang="en-US"/>
           </a:p>
@@ -2166,7 +2170,7 @@
             <a:fld id="{8448BCA8-6BF2-45CA-B2FD-6B3DC378D7FF}" type="datetimeFigureOut">
               <a:rPr lang="en-US" smtClean="0"/>
               <a:pPr/>
-              <a:t>3/2/2016</a:t>
+              <a:t>3/3/2016</a:t>
             </a:fld>
             <a:endParaRPr lang="en-US"/>
           </a:p>
@@ -2294,7 +2298,7 @@
             <a:fld id="{8448BCA8-6BF2-45CA-B2FD-6B3DC378D7FF}" type="datetimeFigureOut">
               <a:rPr lang="en-US" smtClean="0"/>
               <a:pPr/>
-              <a:t>3/2/2016</a:t>
+              <a:t>3/3/2016</a:t>
             </a:fld>
             <a:endParaRPr lang="en-US"/>
           </a:p>
@@ -2440,7 +2444,7 @@
             <a:fld id="{8448BCA8-6BF2-45CA-B2FD-6B3DC378D7FF}" type="datetimeFigureOut">
               <a:rPr lang="en-US" smtClean="0"/>
               <a:pPr/>
-              <a:t>3/2/2016</a:t>
+              <a:t>3/3/2016</a:t>
             </a:fld>
             <a:endParaRPr lang="en-US"/>
           </a:p>
@@ -2764,7 +2768,7 @@
             <a:fld id="{8448BCA8-6BF2-45CA-B2FD-6B3DC378D7FF}" type="datetimeFigureOut">
               <a:rPr lang="en-US" smtClean="0"/>
               <a:pPr/>
-              <a:t>3/2/2016</a:t>
+              <a:t>3/3/2016</a:t>
             </a:fld>
             <a:endParaRPr lang="en-US"/>
           </a:p>
@@ -2900,7 +2904,7 @@
             <a:fld id="{8448BCA8-6BF2-45CA-B2FD-6B3DC378D7FF}" type="datetimeFigureOut">
               <a:rPr lang="en-US" smtClean="0"/>
               <a:pPr/>
-              <a:t>3/2/2016</a:t>
+              <a:t>3/3/2016</a:t>
             </a:fld>
             <a:endParaRPr lang="en-US"/>
           </a:p>
@@ -3683,7 +3687,7 @@
             <a:fld id="{8448BCA8-6BF2-45CA-B2FD-6B3DC378D7FF}" type="datetimeFigureOut">
               <a:rPr lang="en-US" smtClean="0"/>
               <a:pPr/>
-              <a:t>3/2/2016</a:t>
+              <a:t>3/3/2016</a:t>
             </a:fld>
             <a:endParaRPr lang="en-US"/>
           </a:p>
@@ -4348,13 +4352,17 @@
         <p:spPr/>
         <p:txBody>
           <a:bodyPr>
-            <a:normAutofit/>
+            <a:normAutofit fontScale="90000"/>
           </a:bodyPr>
           <a:lstStyle/>
           <a:p>
             <a:r>
               <a:rPr lang="en-US" dirty="0" smtClean="0"/>
-              <a:t>Screen Shot – Add Book</a:t>
+              <a:t>Sequence Diagram – Check </a:t>
+            </a:r>
+            <a:r>
+              <a:rPr lang="en-US" dirty="0" smtClean="0"/>
+              <a:t>In Book</a:t>
             </a:r>
             <a:endParaRPr lang="en-US" dirty="0"/>
           </a:p>
@@ -4362,7 +4370,7 @@
       </p:sp>
       <p:pic>
         <p:nvPicPr>
-          <p:cNvPr id="4098" name="Picture 2" descr="C:\Users\X230s\Google Drive\MUM\MPP\Project\docs\addbook.png"/>
+          <p:cNvPr id="3074" name="Picture 2" descr="C:\Users\X230s\workspace\library-management\docs\CheckIn.png"/>
           <p:cNvPicPr>
             <a:picLocks noChangeAspect="1" noChangeArrowheads="1"/>
           </p:cNvPicPr>
@@ -4377,46 +4385,13 @@
         </p:blipFill>
         <p:spPr bwMode="auto">
           <a:xfrm>
-            <a:off x="304800" y="1219201"/>
-            <a:ext cx="4013043" cy="2666999"/>
+            <a:off x="228600" y="1447800"/>
+            <a:ext cx="8662737" cy="3657600"/>
           </a:xfrm>
           <a:prstGeom prst="rect">
             <a:avLst/>
           </a:prstGeom>
           <a:noFill/>
-        </p:spPr>
-      </p:pic>
-      <p:pic>
-        <p:nvPicPr>
-          <p:cNvPr id="4099" name="Picture 3"/>
-          <p:cNvPicPr>
-            <a:picLocks noChangeAspect="1" noChangeArrowheads="1"/>
-          </p:cNvPicPr>
-          <p:nvPr/>
-        </p:nvPicPr>
-        <p:blipFill>
-          <a:blip r:embed="rId3"/>
-          <a:srcRect/>
-          <a:stretch>
-            <a:fillRect/>
-          </a:stretch>
-        </p:blipFill>
-        <p:spPr bwMode="auto">
-          <a:xfrm>
-            <a:off x="3352800" y="3886200"/>
-            <a:ext cx="5619750" cy="2752725"/>
-          </a:xfrm>
-          <a:prstGeom prst="rect">
-            <a:avLst/>
-          </a:prstGeom>
-          <a:noFill/>
-          <a:ln w="9525">
-            <a:noFill/>
-            <a:miter lim="800000"/>
-            <a:headEnd/>
-            <a:tailEnd/>
-          </a:ln>
-          <a:effectLst/>
         </p:spPr>
       </p:pic>
     </p:spTree>
@@ -4464,13 +4439,13 @@
         <p:spPr/>
         <p:txBody>
           <a:bodyPr>
-            <a:normAutofit fontScale="90000"/>
+            <a:normAutofit/>
           </a:bodyPr>
           <a:lstStyle/>
           <a:p>
             <a:r>
               <a:rPr lang="en-US" dirty="0" smtClean="0"/>
-              <a:t>Sequence Diagram – Add Book Copy</a:t>
+              <a:t>Screen Shot - Login</a:t>
             </a:r>
             <a:endParaRPr lang="en-US" dirty="0"/>
           </a:p>
@@ -4478,7 +4453,7 @@
       </p:sp>
       <p:pic>
         <p:nvPicPr>
-          <p:cNvPr id="6147" name="Picture 3" descr="C:\Users\X230s\workspace\library-management\docs\AddBookCopy.png"/>
+          <p:cNvPr id="1026" name="Picture 2" descr="C:\Users\X230s\Google Drive\MUM\MPP\Project\docs\Login.png"/>
           <p:cNvPicPr>
             <a:picLocks noChangeAspect="1" noChangeArrowheads="1"/>
           </p:cNvPicPr>
@@ -4493,8 +4468,8 @@
         </p:blipFill>
         <p:spPr bwMode="auto">
           <a:xfrm>
-            <a:off x="1143001" y="1676401"/>
-            <a:ext cx="7789076" cy="4343400"/>
+            <a:off x="1447800" y="1219200"/>
+            <a:ext cx="3228189" cy="3581400"/>
           </a:xfrm>
           <a:prstGeom prst="rect">
             <a:avLst/>
@@ -4547,13 +4522,13 @@
         <p:spPr/>
         <p:txBody>
           <a:bodyPr>
-            <a:normAutofit/>
+            <a:normAutofit fontScale="90000"/>
           </a:bodyPr>
           <a:lstStyle/>
           <a:p>
             <a:r>
               <a:rPr lang="en-US" dirty="0" smtClean="0"/>
-              <a:t>Screen Shot – Add Book Copy</a:t>
+              <a:t>Screen Shot – Add New Library Member</a:t>
             </a:r>
             <a:endParaRPr lang="en-US" dirty="0"/>
           </a:p>
@@ -4561,7 +4536,7 @@
       </p:sp>
       <p:pic>
         <p:nvPicPr>
-          <p:cNvPr id="5122" name="Picture 2" descr="C:\Users\X230s\Google Drive\MUM\MPP\Project\docs\addbookcopy.png"/>
+          <p:cNvPr id="4098" name="Picture 2"/>
           <p:cNvPicPr>
             <a:picLocks noChangeAspect="1" noChangeArrowheads="1"/>
           </p:cNvPicPr>
@@ -4576,34 +4551,8 @@
         </p:blipFill>
         <p:spPr bwMode="auto">
           <a:xfrm>
-            <a:off x="228600" y="1295401"/>
-            <a:ext cx="4217538" cy="2819400"/>
-          </a:xfrm>
-          <a:prstGeom prst="rect">
-            <a:avLst/>
-          </a:prstGeom>
-          <a:noFill/>
-        </p:spPr>
-      </p:pic>
-      <p:pic>
-        <p:nvPicPr>
-          <p:cNvPr id="5123" name="Picture 3"/>
-          <p:cNvPicPr>
-            <a:picLocks noChangeAspect="1" noChangeArrowheads="1"/>
-          </p:cNvPicPr>
-          <p:nvPr/>
-        </p:nvPicPr>
-        <p:blipFill>
-          <a:blip r:embed="rId3"/>
-          <a:srcRect/>
-          <a:stretch>
-            <a:fillRect/>
-          </a:stretch>
-        </p:blipFill>
-        <p:spPr bwMode="auto">
-          <a:xfrm>
-            <a:off x="3505200" y="4191000"/>
-            <a:ext cx="4724400" cy="2196015"/>
+            <a:off x="1600200" y="1497582"/>
+            <a:ext cx="6190679" cy="5117530"/>
           </a:xfrm>
           <a:prstGeom prst="rect">
             <a:avLst/>
@@ -4669,31 +4618,78 @@
           <a:p>
             <a:r>
               <a:rPr lang="en-US" dirty="0" smtClean="0"/>
-              <a:t>Sequence Diagram – Check Out Book</a:t>
+              <a:t>Screen Shot – Edit Library Member Information</a:t>
             </a:r>
             <a:endParaRPr lang="en-US" dirty="0"/>
           </a:p>
         </p:txBody>
       </p:sp>
-      <p:sp>
-        <p:nvSpPr>
-          <p:cNvPr id="3" name="Content Placeholder 2"/>
-          <p:cNvSpPr>
-            <a:spLocks noGrp="1"/>
-          </p:cNvSpPr>
-          <p:nvPr>
-            <p:ph idx="1"/>
-          </p:nvPr>
-        </p:nvSpPr>
-        <p:spPr/>
-        <p:txBody>
-          <a:bodyPr/>
-          <a:lstStyle/>
-          <a:p>
-            <a:endParaRPr lang="en-US"/>
-          </a:p>
-        </p:txBody>
-      </p:sp>
+      <p:pic>
+        <p:nvPicPr>
+          <p:cNvPr id="5122" name="Picture 2"/>
+          <p:cNvPicPr>
+            <a:picLocks noChangeAspect="1" noChangeArrowheads="1"/>
+          </p:cNvPicPr>
+          <p:nvPr/>
+        </p:nvPicPr>
+        <p:blipFill>
+          <a:blip r:embed="rId2"/>
+          <a:srcRect/>
+          <a:stretch>
+            <a:fillRect/>
+          </a:stretch>
+        </p:blipFill>
+        <p:spPr bwMode="auto">
+          <a:xfrm>
+            <a:off x="381000" y="1600200"/>
+            <a:ext cx="4332421" cy="3581400"/>
+          </a:xfrm>
+          <a:prstGeom prst="rect">
+            <a:avLst/>
+          </a:prstGeom>
+          <a:noFill/>
+          <a:ln w="9525">
+            <a:noFill/>
+            <a:miter lim="800000"/>
+            <a:headEnd/>
+            <a:tailEnd/>
+          </a:ln>
+          <a:effectLst/>
+        </p:spPr>
+      </p:pic>
+      <p:pic>
+        <p:nvPicPr>
+          <p:cNvPr id="5123" name="Picture 3"/>
+          <p:cNvPicPr>
+            <a:picLocks noChangeAspect="1" noChangeArrowheads="1"/>
+          </p:cNvPicPr>
+          <p:nvPr/>
+        </p:nvPicPr>
+        <p:blipFill>
+          <a:blip r:embed="rId3"/>
+          <a:srcRect/>
+          <a:stretch>
+            <a:fillRect/>
+          </a:stretch>
+        </p:blipFill>
+        <p:spPr bwMode="auto">
+          <a:xfrm>
+            <a:off x="4724400" y="2975934"/>
+            <a:ext cx="4419600" cy="3653466"/>
+          </a:xfrm>
+          <a:prstGeom prst="rect">
+            <a:avLst/>
+          </a:prstGeom>
+          <a:noFill/>
+          <a:ln w="9525">
+            <a:noFill/>
+            <a:miter lim="800000"/>
+            <a:headEnd/>
+            <a:tailEnd/>
+          </a:ln>
+          <a:effectLst/>
+        </p:spPr>
+      </p:pic>
     </p:spTree>
   </p:cSld>
   <p:clrMapOvr>
@@ -4710,6 +4706,407 @@
 </file>
 
 <file path=ppt/slides/slide14.xml><?xml version="1.0" encoding="utf-8"?>
+<p:sld xmlns:a="http://schemas.openxmlformats.org/drawingml/2006/main" xmlns:r="http://schemas.openxmlformats.org/officeDocument/2006/relationships" xmlns:p="http://schemas.openxmlformats.org/presentationml/2006/main">
+  <p:cSld>
+    <p:spTree>
+      <p:nvGrpSpPr>
+        <p:cNvPr id="1" name=""/>
+        <p:cNvGrpSpPr/>
+        <p:nvPr/>
+      </p:nvGrpSpPr>
+      <p:grpSpPr>
+        <a:xfrm>
+          <a:off x="0" y="0"/>
+          <a:ext cx="0" cy="0"/>
+          <a:chOff x="0" y="0"/>
+          <a:chExt cx="0" cy="0"/>
+        </a:xfrm>
+      </p:grpSpPr>
+      <p:sp>
+        <p:nvSpPr>
+          <p:cNvPr id="2" name="Title 1"/>
+          <p:cNvSpPr>
+            <a:spLocks noGrp="1"/>
+          </p:cNvSpPr>
+          <p:nvPr>
+            <p:ph type="title"/>
+          </p:nvPr>
+        </p:nvSpPr>
+        <p:spPr/>
+        <p:txBody>
+          <a:bodyPr>
+            <a:normAutofit/>
+          </a:bodyPr>
+          <a:lstStyle/>
+          <a:p>
+            <a:r>
+              <a:rPr lang="en-US" dirty="0" smtClean="0"/>
+              <a:t>Screen Shot – Add Book</a:t>
+            </a:r>
+            <a:endParaRPr lang="en-US" dirty="0"/>
+          </a:p>
+        </p:txBody>
+      </p:sp>
+      <p:pic>
+        <p:nvPicPr>
+          <p:cNvPr id="6147" name="Picture 3"/>
+          <p:cNvPicPr>
+            <a:picLocks noChangeAspect="1" noChangeArrowheads="1"/>
+          </p:cNvPicPr>
+          <p:nvPr/>
+        </p:nvPicPr>
+        <p:blipFill>
+          <a:blip r:embed="rId2"/>
+          <a:srcRect/>
+          <a:stretch>
+            <a:fillRect/>
+          </a:stretch>
+        </p:blipFill>
+        <p:spPr bwMode="auto">
+          <a:xfrm>
+            <a:off x="1447799" y="1371600"/>
+            <a:ext cx="6216354" cy="5120640"/>
+          </a:xfrm>
+          <a:prstGeom prst="rect">
+            <a:avLst/>
+          </a:prstGeom>
+          <a:noFill/>
+          <a:ln w="9525">
+            <a:noFill/>
+            <a:miter lim="800000"/>
+            <a:headEnd/>
+            <a:tailEnd/>
+          </a:ln>
+          <a:effectLst/>
+        </p:spPr>
+      </p:pic>
+    </p:spTree>
+  </p:cSld>
+  <p:clrMapOvr>
+    <a:masterClrMapping/>
+  </p:clrMapOvr>
+  <p:timing>
+    <p:tnLst>
+      <p:par>
+        <p:cTn id="1" dur="indefinite" restart="never" nodeType="tmRoot"/>
+      </p:par>
+    </p:tnLst>
+  </p:timing>
+</p:sld>
+</file>
+
+<file path=ppt/slides/slide15.xml><?xml version="1.0" encoding="utf-8"?>
+<p:sld xmlns:a="http://schemas.openxmlformats.org/drawingml/2006/main" xmlns:r="http://schemas.openxmlformats.org/officeDocument/2006/relationships" xmlns:p="http://schemas.openxmlformats.org/presentationml/2006/main">
+  <p:cSld>
+    <p:spTree>
+      <p:nvGrpSpPr>
+        <p:cNvPr id="1" name=""/>
+        <p:cNvGrpSpPr/>
+        <p:nvPr/>
+      </p:nvGrpSpPr>
+      <p:grpSpPr>
+        <a:xfrm>
+          <a:off x="0" y="0"/>
+          <a:ext cx="0" cy="0"/>
+          <a:chOff x="0" y="0"/>
+          <a:chExt cx="0" cy="0"/>
+        </a:xfrm>
+      </p:grpSpPr>
+      <p:sp>
+        <p:nvSpPr>
+          <p:cNvPr id="2" name="Title 1"/>
+          <p:cNvSpPr>
+            <a:spLocks noGrp="1"/>
+          </p:cNvSpPr>
+          <p:nvPr>
+            <p:ph type="title"/>
+          </p:nvPr>
+        </p:nvSpPr>
+        <p:spPr/>
+        <p:txBody>
+          <a:bodyPr>
+            <a:normAutofit/>
+          </a:bodyPr>
+          <a:lstStyle/>
+          <a:p>
+            <a:r>
+              <a:rPr lang="en-US" dirty="0" smtClean="0"/>
+              <a:t>Screen Shot – Add Book Copy</a:t>
+            </a:r>
+            <a:endParaRPr lang="en-US" dirty="0"/>
+          </a:p>
+        </p:txBody>
+      </p:sp>
+      <p:pic>
+        <p:nvPicPr>
+          <p:cNvPr id="7170" name="Picture 2"/>
+          <p:cNvPicPr>
+            <a:picLocks noChangeAspect="1" noChangeArrowheads="1"/>
+          </p:cNvPicPr>
+          <p:nvPr/>
+        </p:nvPicPr>
+        <p:blipFill>
+          <a:blip r:embed="rId2"/>
+          <a:srcRect/>
+          <a:stretch>
+            <a:fillRect/>
+          </a:stretch>
+        </p:blipFill>
+        <p:spPr bwMode="auto">
+          <a:xfrm>
+            <a:off x="1371600" y="1371600"/>
+            <a:ext cx="6152031" cy="5120640"/>
+          </a:xfrm>
+          <a:prstGeom prst="rect">
+            <a:avLst/>
+          </a:prstGeom>
+          <a:noFill/>
+          <a:ln w="9525">
+            <a:noFill/>
+            <a:miter lim="800000"/>
+            <a:headEnd/>
+            <a:tailEnd/>
+          </a:ln>
+          <a:effectLst/>
+        </p:spPr>
+      </p:pic>
+    </p:spTree>
+  </p:cSld>
+  <p:clrMapOvr>
+    <a:masterClrMapping/>
+  </p:clrMapOvr>
+  <p:timing>
+    <p:tnLst>
+      <p:par>
+        <p:cTn id="1" dur="indefinite" restart="never" nodeType="tmRoot"/>
+      </p:par>
+    </p:tnLst>
+  </p:timing>
+</p:sld>
+</file>
+
+<file path=ppt/slides/slide16.xml><?xml version="1.0" encoding="utf-8"?>
+<p:sld xmlns:a="http://schemas.openxmlformats.org/drawingml/2006/main" xmlns:r="http://schemas.openxmlformats.org/officeDocument/2006/relationships" xmlns:p="http://schemas.openxmlformats.org/presentationml/2006/main">
+  <p:cSld>
+    <p:spTree>
+      <p:nvGrpSpPr>
+        <p:cNvPr id="1" name=""/>
+        <p:cNvGrpSpPr/>
+        <p:nvPr/>
+      </p:nvGrpSpPr>
+      <p:grpSpPr>
+        <a:xfrm>
+          <a:off x="0" y="0"/>
+          <a:ext cx="0" cy="0"/>
+          <a:chOff x="0" y="0"/>
+          <a:chExt cx="0" cy="0"/>
+        </a:xfrm>
+      </p:grpSpPr>
+      <p:sp>
+        <p:nvSpPr>
+          <p:cNvPr id="2" name="Title 1"/>
+          <p:cNvSpPr>
+            <a:spLocks noGrp="1"/>
+          </p:cNvSpPr>
+          <p:nvPr>
+            <p:ph type="title"/>
+          </p:nvPr>
+        </p:nvSpPr>
+        <p:spPr/>
+        <p:txBody>
+          <a:bodyPr>
+            <a:normAutofit/>
+          </a:bodyPr>
+          <a:lstStyle/>
+          <a:p>
+            <a:r>
+              <a:rPr lang="en-US" dirty="0" smtClean="0"/>
+              <a:t>Screen Shot – </a:t>
+            </a:r>
+            <a:r>
+              <a:rPr lang="en-US" dirty="0" smtClean="0"/>
+              <a:t>Check Out Book</a:t>
+            </a:r>
+            <a:endParaRPr lang="en-US" dirty="0"/>
+          </a:p>
+        </p:txBody>
+      </p:sp>
+      <p:pic>
+        <p:nvPicPr>
+          <p:cNvPr id="8194" name="Picture 2"/>
+          <p:cNvPicPr>
+            <a:picLocks noChangeAspect="1" noChangeArrowheads="1"/>
+          </p:cNvPicPr>
+          <p:nvPr/>
+        </p:nvPicPr>
+        <p:blipFill>
+          <a:blip r:embed="rId2"/>
+          <a:srcRect/>
+          <a:stretch>
+            <a:fillRect/>
+          </a:stretch>
+        </p:blipFill>
+        <p:spPr bwMode="auto">
+          <a:xfrm>
+            <a:off x="304800" y="1371600"/>
+            <a:ext cx="3962400" cy="3275522"/>
+          </a:xfrm>
+          <a:prstGeom prst="rect">
+            <a:avLst/>
+          </a:prstGeom>
+          <a:noFill/>
+          <a:ln w="9525">
+            <a:noFill/>
+            <a:miter lim="800000"/>
+            <a:headEnd/>
+            <a:tailEnd/>
+          </a:ln>
+          <a:effectLst/>
+        </p:spPr>
+      </p:pic>
+      <p:pic>
+        <p:nvPicPr>
+          <p:cNvPr id="8196" name="Picture 4"/>
+          <p:cNvPicPr>
+            <a:picLocks noChangeAspect="1" noChangeArrowheads="1"/>
+          </p:cNvPicPr>
+          <p:nvPr/>
+        </p:nvPicPr>
+        <p:blipFill>
+          <a:blip r:embed="rId3"/>
+          <a:srcRect/>
+          <a:stretch>
+            <a:fillRect/>
+          </a:stretch>
+        </p:blipFill>
+        <p:spPr bwMode="auto">
+          <a:xfrm>
+            <a:off x="4343400" y="2889579"/>
+            <a:ext cx="4800600" cy="3968421"/>
+          </a:xfrm>
+          <a:prstGeom prst="rect">
+            <a:avLst/>
+          </a:prstGeom>
+          <a:noFill/>
+          <a:ln w="9525">
+            <a:noFill/>
+            <a:miter lim="800000"/>
+            <a:headEnd/>
+            <a:tailEnd/>
+          </a:ln>
+          <a:effectLst/>
+        </p:spPr>
+      </p:pic>
+    </p:spTree>
+  </p:cSld>
+  <p:clrMapOvr>
+    <a:masterClrMapping/>
+  </p:clrMapOvr>
+  <p:timing>
+    <p:tnLst>
+      <p:par>
+        <p:cTn id="1" dur="indefinite" restart="never" nodeType="tmRoot"/>
+      </p:par>
+    </p:tnLst>
+  </p:timing>
+</p:sld>
+</file>
+
+<file path=ppt/slides/slide17.xml><?xml version="1.0" encoding="utf-8"?>
+<p:sld xmlns:a="http://schemas.openxmlformats.org/drawingml/2006/main" xmlns:r="http://schemas.openxmlformats.org/officeDocument/2006/relationships" xmlns:p="http://schemas.openxmlformats.org/presentationml/2006/main">
+  <p:cSld>
+    <p:spTree>
+      <p:nvGrpSpPr>
+        <p:cNvPr id="1" name=""/>
+        <p:cNvGrpSpPr/>
+        <p:nvPr/>
+      </p:nvGrpSpPr>
+      <p:grpSpPr>
+        <a:xfrm>
+          <a:off x="0" y="0"/>
+          <a:ext cx="0" cy="0"/>
+          <a:chOff x="0" y="0"/>
+          <a:chExt cx="0" cy="0"/>
+        </a:xfrm>
+      </p:grpSpPr>
+      <p:sp>
+        <p:nvSpPr>
+          <p:cNvPr id="2" name="Title 1"/>
+          <p:cNvSpPr>
+            <a:spLocks noGrp="1"/>
+          </p:cNvSpPr>
+          <p:nvPr>
+            <p:ph type="title"/>
+          </p:nvPr>
+        </p:nvSpPr>
+        <p:spPr/>
+        <p:txBody>
+          <a:bodyPr>
+            <a:normAutofit/>
+          </a:bodyPr>
+          <a:lstStyle/>
+          <a:p>
+            <a:r>
+              <a:rPr lang="en-US" dirty="0" smtClean="0"/>
+              <a:t>Screen Shot – </a:t>
+            </a:r>
+            <a:r>
+              <a:rPr lang="en-US" dirty="0" smtClean="0"/>
+              <a:t>Check In Book</a:t>
+            </a:r>
+            <a:endParaRPr lang="en-US" dirty="0"/>
+          </a:p>
+        </p:txBody>
+      </p:sp>
+      <p:pic>
+        <p:nvPicPr>
+          <p:cNvPr id="9218" name="Picture 2"/>
+          <p:cNvPicPr>
+            <a:picLocks noChangeAspect="1" noChangeArrowheads="1"/>
+          </p:cNvPicPr>
+          <p:nvPr/>
+        </p:nvPicPr>
+        <p:blipFill>
+          <a:blip r:embed="rId2"/>
+          <a:srcRect/>
+          <a:stretch>
+            <a:fillRect/>
+          </a:stretch>
+        </p:blipFill>
+        <p:spPr bwMode="auto">
+          <a:xfrm>
+            <a:off x="1371600" y="1219200"/>
+            <a:ext cx="6194441" cy="5120640"/>
+          </a:xfrm>
+          <a:prstGeom prst="rect">
+            <a:avLst/>
+          </a:prstGeom>
+          <a:noFill/>
+          <a:ln w="9525">
+            <a:noFill/>
+            <a:miter lim="800000"/>
+            <a:headEnd/>
+            <a:tailEnd/>
+          </a:ln>
+          <a:effectLst/>
+        </p:spPr>
+      </p:pic>
+    </p:spTree>
+  </p:cSld>
+  <p:clrMapOvr>
+    <a:masterClrMapping/>
+  </p:clrMapOvr>
+  <p:timing>
+    <p:tnLst>
+      <p:par>
+        <p:cTn id="1" dur="indefinite" restart="never" nodeType="tmRoot"/>
+      </p:par>
+    </p:tnLst>
+  </p:timing>
+</p:sld>
+</file>
+
+<file path=ppt/slides/slide18.xml><?xml version="1.0" encoding="utf-8"?>
 <p:sld xmlns:a="http://schemas.openxmlformats.org/drawingml/2006/main" xmlns:r="http://schemas.openxmlformats.org/officeDocument/2006/relationships" xmlns:p="http://schemas.openxmlformats.org/presentationml/2006/main">
   <p:cSld>
     <p:spTree>
@@ -4767,7 +5164,7 @@
 </p:sld>
 </file>
 
-<file path=ppt/slides/slide15.xml><?xml version="1.0" encoding="utf-8"?>
+<file path=ppt/slides/slide19.xml><?xml version="1.0" encoding="utf-8"?>
 <p:sld xmlns:a="http://schemas.openxmlformats.org/drawingml/2006/main" xmlns:r="http://schemas.openxmlformats.org/officeDocument/2006/relationships" xmlns:p="http://schemas.openxmlformats.org/presentationml/2006/main">
   <p:cSld>
     <p:spTree>
@@ -5017,13 +5414,13 @@
         <p:spPr/>
         <p:txBody>
           <a:bodyPr>
-            <a:normAutofit/>
+            <a:normAutofit fontScale="90000"/>
           </a:bodyPr>
           <a:lstStyle/>
           <a:p>
             <a:r>
               <a:rPr lang="en-US" dirty="0" smtClean="0"/>
-              <a:t>Screen Shot - Login</a:t>
+              <a:t>Sequence Diagram – Add New Library Member</a:t>
             </a:r>
             <a:endParaRPr lang="en-US" dirty="0"/>
           </a:p>
@@ -5031,7 +5428,7 @@
       </p:sp>
       <p:pic>
         <p:nvPicPr>
-          <p:cNvPr id="1026" name="Picture 2" descr="C:\Users\X230s\Google Drive\MUM\MPP\Project\docs\Login.png"/>
+          <p:cNvPr id="3074" name="Picture 2" descr="C:\Users\X230s\workspace\library-management\docs\AddNewLibraryMember.png"/>
           <p:cNvPicPr>
             <a:picLocks noChangeAspect="1" noChangeArrowheads="1"/>
           </p:cNvPicPr>
@@ -5046,46 +5443,13 @@
         </p:blipFill>
         <p:spPr bwMode="auto">
           <a:xfrm>
-            <a:off x="1447800" y="1219200"/>
-            <a:ext cx="3228189" cy="3581400"/>
+            <a:off x="1066801" y="1676400"/>
+            <a:ext cx="7848600" cy="4262348"/>
           </a:xfrm>
           <a:prstGeom prst="rect">
             <a:avLst/>
           </a:prstGeom>
           <a:noFill/>
-        </p:spPr>
-      </p:pic>
-      <p:pic>
-        <p:nvPicPr>
-          <p:cNvPr id="1027" name="Picture 3"/>
-          <p:cNvPicPr>
-            <a:picLocks noChangeAspect="1" noChangeArrowheads="1"/>
-          </p:cNvPicPr>
-          <p:nvPr/>
-        </p:nvPicPr>
-        <p:blipFill>
-          <a:blip r:embed="rId3"/>
-          <a:srcRect/>
-          <a:stretch>
-            <a:fillRect/>
-          </a:stretch>
-        </p:blipFill>
-        <p:spPr bwMode="auto">
-          <a:xfrm>
-            <a:off x="4953000" y="3650242"/>
-            <a:ext cx="4191000" cy="2788658"/>
-          </a:xfrm>
-          <a:prstGeom prst="rect">
-            <a:avLst/>
-          </a:prstGeom>
-          <a:noFill/>
-          <a:ln w="9525">
-            <a:noFill/>
-            <a:miter lim="800000"/>
-            <a:headEnd/>
-            <a:tailEnd/>
-          </a:ln>
-          <a:effectLst/>
         </p:spPr>
       </p:pic>
     </p:spTree>
@@ -5139,7 +5503,7 @@
           <a:p>
             <a:r>
               <a:rPr lang="en-US" dirty="0" smtClean="0"/>
-              <a:t>Sequence Diagram – Add New Library Member</a:t>
+              <a:t>Sequence Diagram – Edit New Library Member</a:t>
             </a:r>
             <a:endParaRPr lang="en-US" dirty="0"/>
           </a:p>
@@ -5147,7 +5511,7 @@
       </p:sp>
       <p:pic>
         <p:nvPicPr>
-          <p:cNvPr id="3074" name="Picture 2" descr="C:\Users\X230s\workspace\library-management\docs\AddNewLibraryMember.png"/>
+          <p:cNvPr id="4098" name="Picture 2" descr="C:\Users\X230s\workspace\library-management\docs\EditLibraryMember.png"/>
           <p:cNvPicPr>
             <a:picLocks noChangeAspect="1" noChangeArrowheads="1"/>
           </p:cNvPicPr>
@@ -5162,8 +5526,8 @@
         </p:blipFill>
         <p:spPr bwMode="auto">
           <a:xfrm>
-            <a:off x="1066801" y="1676400"/>
-            <a:ext cx="7848600" cy="4262348"/>
+            <a:off x="1066800" y="1905000"/>
+            <a:ext cx="7922961" cy="4343400"/>
           </a:xfrm>
           <a:prstGeom prst="rect">
             <a:avLst/>
@@ -5216,13 +5580,13 @@
         <p:spPr/>
         <p:txBody>
           <a:bodyPr>
-            <a:normAutofit fontScale="90000"/>
+            <a:normAutofit/>
           </a:bodyPr>
           <a:lstStyle/>
           <a:p>
             <a:r>
               <a:rPr lang="en-US" dirty="0" smtClean="0"/>
-              <a:t>Screen Shot – Add New Library Member</a:t>
+              <a:t>Sequence Diagram – Add Book</a:t>
             </a:r>
             <a:endParaRPr lang="en-US" dirty="0"/>
           </a:p>
@@ -5230,7 +5594,7 @@
       </p:sp>
       <p:pic>
         <p:nvPicPr>
-          <p:cNvPr id="2050" name="Picture 2" descr="C:\Users\X230s\Google Drive\MUM\MPP\Project\docs\addnewlibrarymember.png"/>
+          <p:cNvPr id="5122" name="Picture 2" descr="C:\Users\X230s\workspace\library-management\docs\AddBook.png"/>
           <p:cNvPicPr>
             <a:picLocks noChangeAspect="1" noChangeArrowheads="1"/>
           </p:cNvPicPr>
@@ -5245,46 +5609,13 @@
         </p:blipFill>
         <p:spPr bwMode="auto">
           <a:xfrm>
-            <a:off x="152400" y="1524000"/>
-            <a:ext cx="3962400" cy="2620837"/>
+            <a:off x="1295400" y="1447800"/>
+            <a:ext cx="7620000" cy="4911576"/>
           </a:xfrm>
           <a:prstGeom prst="rect">
             <a:avLst/>
           </a:prstGeom>
           <a:noFill/>
-        </p:spPr>
-      </p:pic>
-      <p:pic>
-        <p:nvPicPr>
-          <p:cNvPr id="2051" name="Picture 3"/>
-          <p:cNvPicPr>
-            <a:picLocks noChangeAspect="1" noChangeArrowheads="1"/>
-          </p:cNvPicPr>
-          <p:nvPr/>
-        </p:nvPicPr>
-        <p:blipFill>
-          <a:blip r:embed="rId3"/>
-          <a:srcRect/>
-          <a:stretch>
-            <a:fillRect/>
-          </a:stretch>
-        </p:blipFill>
-        <p:spPr bwMode="auto">
-          <a:xfrm>
-            <a:off x="4191001" y="3390286"/>
-            <a:ext cx="4953000" cy="3467714"/>
-          </a:xfrm>
-          <a:prstGeom prst="rect">
-            <a:avLst/>
-          </a:prstGeom>
-          <a:noFill/>
-          <a:ln w="9525">
-            <a:noFill/>
-            <a:miter lim="800000"/>
-            <a:headEnd/>
-            <a:tailEnd/>
-          </a:ln>
-          <a:effectLst/>
         </p:spPr>
       </p:pic>
     </p:spTree>
@@ -5338,7 +5669,7 @@
           <a:p>
             <a:r>
               <a:rPr lang="en-US" dirty="0" smtClean="0"/>
-              <a:t>Sequence Diagram – Edit New Library Member</a:t>
+              <a:t>Sequence Diagram – Add Book Copy</a:t>
             </a:r>
             <a:endParaRPr lang="en-US" dirty="0"/>
           </a:p>
@@ -5346,7 +5677,7 @@
       </p:sp>
       <p:pic>
         <p:nvPicPr>
-          <p:cNvPr id="4098" name="Picture 2" descr="C:\Users\X230s\workspace\library-management\docs\EditLibraryMember.png"/>
+          <p:cNvPr id="6147" name="Picture 3" descr="C:\Users\X230s\workspace\library-management\docs\AddBookCopy.png"/>
           <p:cNvPicPr>
             <a:picLocks noChangeAspect="1" noChangeArrowheads="1"/>
           </p:cNvPicPr>
@@ -5361,8 +5692,8 @@
         </p:blipFill>
         <p:spPr bwMode="auto">
           <a:xfrm>
-            <a:off x="1066800" y="1905000"/>
-            <a:ext cx="7922961" cy="4343400"/>
+            <a:off x="1143001" y="1676401"/>
+            <a:ext cx="7789076" cy="4343400"/>
           </a:xfrm>
           <a:prstGeom prst="rect">
             <a:avLst/>
@@ -5421,7 +5752,7 @@
           <a:p>
             <a:r>
               <a:rPr lang="en-US" dirty="0" smtClean="0"/>
-              <a:t>Screen Shot – Edit Library Member Information</a:t>
+              <a:t>Sequence Diagram – Check Out Book</a:t>
             </a:r>
             <a:endParaRPr lang="en-US" dirty="0"/>
           </a:p>
@@ -5429,7 +5760,7 @@
       </p:sp>
       <p:pic>
         <p:nvPicPr>
-          <p:cNvPr id="4" name="Picture 3"/>
+          <p:cNvPr id="1026" name="Picture 2" descr="C:\Users\X230s\workspace\library-management\docs\Checkout.png"/>
           <p:cNvPicPr>
             <a:picLocks noChangeAspect="1" noChangeArrowheads="1"/>
           </p:cNvPicPr>
@@ -5444,41 +5775,8 @@
         </p:blipFill>
         <p:spPr bwMode="auto">
           <a:xfrm>
-            <a:off x="4191001" y="3390286"/>
-            <a:ext cx="4953000" cy="3467714"/>
-          </a:xfrm>
-          <a:prstGeom prst="rect">
-            <a:avLst/>
-          </a:prstGeom>
-          <a:noFill/>
-          <a:ln w="9525">
-            <a:noFill/>
-            <a:miter lim="800000"/>
-            <a:headEnd/>
-            <a:tailEnd/>
-          </a:ln>
-          <a:effectLst/>
-        </p:spPr>
-      </p:pic>
-      <p:pic>
-        <p:nvPicPr>
-          <p:cNvPr id="3074" name="Picture 2" descr="C:\Users\X230s\Google Drive\MUM\MPP\Project\docs\editmember.png"/>
-          <p:cNvPicPr>
-            <a:picLocks noChangeAspect="1" noChangeArrowheads="1"/>
-          </p:cNvPicPr>
-          <p:nvPr/>
-        </p:nvPicPr>
-        <p:blipFill>
-          <a:blip r:embed="rId3"/>
-          <a:srcRect/>
-          <a:stretch>
-            <a:fillRect/>
-          </a:stretch>
-        </p:blipFill>
-        <p:spPr bwMode="auto">
-          <a:xfrm>
-            <a:off x="304800" y="1371601"/>
-            <a:ext cx="4147400" cy="2743200"/>
+            <a:off x="1600200" y="1371600"/>
+            <a:ext cx="7315200" cy="5262262"/>
           </a:xfrm>
           <a:prstGeom prst="rect">
             <a:avLst/>
@@ -5531,13 +5829,17 @@
         <p:spPr/>
         <p:txBody>
           <a:bodyPr>
-            <a:normAutofit/>
+            <a:normAutofit fontScale="90000"/>
           </a:bodyPr>
           <a:lstStyle/>
           <a:p>
             <a:r>
               <a:rPr lang="en-US" dirty="0" smtClean="0"/>
-              <a:t>Sequence Diagram – Add Book</a:t>
+              <a:t>Sequence Diagram – Check Out </a:t>
+            </a:r>
+            <a:r>
+              <a:rPr lang="en-US" dirty="0" smtClean="0"/>
+              <a:t>Book (contd..)</a:t>
             </a:r>
             <a:endParaRPr lang="en-US" dirty="0"/>
           </a:p>
@@ -5545,7 +5847,7 @@
       </p:sp>
       <p:pic>
         <p:nvPicPr>
-          <p:cNvPr id="5122" name="Picture 2" descr="C:\Users\X230s\workspace\library-management\docs\AddBook.png"/>
+          <p:cNvPr id="2050" name="Picture 2" descr="C:\Users\X230s\workspace\library-management\docs\Checkout_contd.png"/>
           <p:cNvPicPr>
             <a:picLocks noChangeAspect="1" noChangeArrowheads="1"/>
           </p:cNvPicPr>
@@ -5560,8 +5862,8 @@
         </p:blipFill>
         <p:spPr bwMode="auto">
           <a:xfrm>
-            <a:off x="1295400" y="1447800"/>
-            <a:ext cx="7620000" cy="4911576"/>
+            <a:off x="457200" y="1981200"/>
+            <a:ext cx="8507810" cy="3886200"/>
           </a:xfrm>
           <a:prstGeom prst="rect">
             <a:avLst/>

</xml_diff>

<commit_message>
corrected the presentation and the uml diagrams
</commit_message>
<xml_diff>
--- a/docs/Library Management System.pptx
+++ b/docs/Library Management System.pptx
@@ -7,23 +7,25 @@
   <p:sldIdLst>
     <p:sldId id="257" r:id="rId2"/>
     <p:sldId id="258" r:id="rId3"/>
-    <p:sldId id="266" r:id="rId4"/>
-    <p:sldId id="259" r:id="rId5"/>
-    <p:sldId id="260" r:id="rId6"/>
-    <p:sldId id="261" r:id="rId7"/>
-    <p:sldId id="262" r:id="rId8"/>
-    <p:sldId id="265" r:id="rId9"/>
-    <p:sldId id="277" r:id="rId10"/>
-    <p:sldId id="278" r:id="rId11"/>
-    <p:sldId id="272" r:id="rId12"/>
-    <p:sldId id="273" r:id="rId13"/>
-    <p:sldId id="274" r:id="rId14"/>
-    <p:sldId id="275" r:id="rId15"/>
-    <p:sldId id="276" r:id="rId16"/>
-    <p:sldId id="279" r:id="rId17"/>
-    <p:sldId id="280" r:id="rId18"/>
-    <p:sldId id="263" r:id="rId19"/>
-    <p:sldId id="264" r:id="rId20"/>
+    <p:sldId id="281" r:id="rId4"/>
+    <p:sldId id="282" r:id="rId5"/>
+    <p:sldId id="266" r:id="rId6"/>
+    <p:sldId id="283" r:id="rId7"/>
+    <p:sldId id="259" r:id="rId8"/>
+    <p:sldId id="284" r:id="rId9"/>
+    <p:sldId id="260" r:id="rId10"/>
+    <p:sldId id="285" r:id="rId11"/>
+    <p:sldId id="261" r:id="rId12"/>
+    <p:sldId id="286" r:id="rId13"/>
+    <p:sldId id="262" r:id="rId14"/>
+    <p:sldId id="287" r:id="rId15"/>
+    <p:sldId id="265" r:id="rId16"/>
+    <p:sldId id="277" r:id="rId17"/>
+    <p:sldId id="288" r:id="rId18"/>
+    <p:sldId id="278" r:id="rId19"/>
+    <p:sldId id="289" r:id="rId20"/>
+    <p:sldId id="263" r:id="rId21"/>
+    <p:sldId id="264" r:id="rId22"/>
   </p:sldIdLst>
   <p:sldSz cx="9144000" cy="6858000" type="screen4x3"/>
   <p:notesSz cx="6858000" cy="9144000"/>
@@ -4358,11 +4360,7 @@
           <a:p>
             <a:r>
               <a:rPr lang="en-US" dirty="0" smtClean="0"/>
-              <a:t>Sequence Diagram – Check </a:t>
-            </a:r>
-            <a:r>
-              <a:rPr lang="en-US" dirty="0" smtClean="0"/>
-              <a:t>In Book</a:t>
+              <a:t>Screen Shot – Edit Library Member Information</a:t>
             </a:r>
             <a:endParaRPr lang="en-US" dirty="0"/>
           </a:p>
@@ -4370,7 +4368,7 @@
       </p:sp>
       <p:pic>
         <p:nvPicPr>
-          <p:cNvPr id="3074" name="Picture 2" descr="C:\Users\X230s\workspace\library-management\docs\CheckIn.png"/>
+          <p:cNvPr id="5122" name="Picture 2"/>
           <p:cNvPicPr>
             <a:picLocks noChangeAspect="1" noChangeArrowheads="1"/>
           </p:cNvPicPr>
@@ -4385,13 +4383,53 @@
         </p:blipFill>
         <p:spPr bwMode="auto">
           <a:xfrm>
-            <a:off x="228600" y="1447800"/>
-            <a:ext cx="8662737" cy="3657600"/>
+            <a:off x="381000" y="1600200"/>
+            <a:ext cx="4332421" cy="3581400"/>
           </a:xfrm>
           <a:prstGeom prst="rect">
             <a:avLst/>
           </a:prstGeom>
           <a:noFill/>
+          <a:ln w="9525">
+            <a:noFill/>
+            <a:miter lim="800000"/>
+            <a:headEnd/>
+            <a:tailEnd/>
+          </a:ln>
+          <a:effectLst/>
+        </p:spPr>
+      </p:pic>
+      <p:pic>
+        <p:nvPicPr>
+          <p:cNvPr id="5123" name="Picture 3"/>
+          <p:cNvPicPr>
+            <a:picLocks noChangeAspect="1" noChangeArrowheads="1"/>
+          </p:cNvPicPr>
+          <p:nvPr/>
+        </p:nvPicPr>
+        <p:blipFill>
+          <a:blip r:embed="rId3"/>
+          <a:srcRect/>
+          <a:stretch>
+            <a:fillRect/>
+          </a:stretch>
+        </p:blipFill>
+        <p:spPr bwMode="auto">
+          <a:xfrm>
+            <a:off x="4724400" y="2975934"/>
+            <a:ext cx="4419600" cy="3653466"/>
+          </a:xfrm>
+          <a:prstGeom prst="rect">
+            <a:avLst/>
+          </a:prstGeom>
+          <a:noFill/>
+          <a:ln w="9525">
+            <a:noFill/>
+            <a:miter lim="800000"/>
+            <a:headEnd/>
+            <a:tailEnd/>
+          </a:ln>
+          <a:effectLst/>
         </p:spPr>
       </p:pic>
     </p:spTree>
@@ -4445,7 +4483,7 @@
           <a:p>
             <a:r>
               <a:rPr lang="en-US" dirty="0" smtClean="0"/>
-              <a:t>Screen Shot - Login</a:t>
+              <a:t>Sequence Diagram – Add Book</a:t>
             </a:r>
             <a:endParaRPr lang="en-US" dirty="0"/>
           </a:p>
@@ -4453,7 +4491,7 @@
       </p:sp>
       <p:pic>
         <p:nvPicPr>
-          <p:cNvPr id="1026" name="Picture 2" descr="C:\Users\X230s\Google Drive\MUM\MPP\Project\docs\Login.png"/>
+          <p:cNvPr id="4098" name="Picture 2" descr="C:\Users\X230s\workspace\library-management\docs\AddBook.png"/>
           <p:cNvPicPr>
             <a:picLocks noChangeAspect="1" noChangeArrowheads="1"/>
           </p:cNvPicPr>
@@ -4468,8 +4506,8 @@
         </p:blipFill>
         <p:spPr bwMode="auto">
           <a:xfrm>
-            <a:off x="1447800" y="1219200"/>
-            <a:ext cx="3228189" cy="3581400"/>
+            <a:off x="304800" y="1447800"/>
+            <a:ext cx="8685679" cy="4233880"/>
           </a:xfrm>
           <a:prstGeom prst="rect">
             <a:avLst/>
@@ -4522,13 +4560,13 @@
         <p:spPr/>
         <p:txBody>
           <a:bodyPr>
-            <a:normAutofit fontScale="90000"/>
+            <a:normAutofit/>
           </a:bodyPr>
           <a:lstStyle/>
           <a:p>
             <a:r>
               <a:rPr lang="en-US" dirty="0" smtClean="0"/>
-              <a:t>Screen Shot – Add New Library Member</a:t>
+              <a:t>Screen Shot – Add Book</a:t>
             </a:r>
             <a:endParaRPr lang="en-US" dirty="0"/>
           </a:p>
@@ -4536,7 +4574,7 @@
       </p:sp>
       <p:pic>
         <p:nvPicPr>
-          <p:cNvPr id="4098" name="Picture 2"/>
+          <p:cNvPr id="6147" name="Picture 3"/>
           <p:cNvPicPr>
             <a:picLocks noChangeAspect="1" noChangeArrowheads="1"/>
           </p:cNvPicPr>
@@ -4551,8 +4589,8 @@
         </p:blipFill>
         <p:spPr bwMode="auto">
           <a:xfrm>
-            <a:off x="1600200" y="1497582"/>
-            <a:ext cx="6190679" cy="5117530"/>
+            <a:off x="1447799" y="1371600"/>
+            <a:ext cx="6216354" cy="5120640"/>
           </a:xfrm>
           <a:prstGeom prst="rect">
             <a:avLst/>
@@ -4618,7 +4656,7 @@
           <a:p>
             <a:r>
               <a:rPr lang="en-US" dirty="0" smtClean="0"/>
-              <a:t>Screen Shot – Edit Library Member Information</a:t>
+              <a:t>Sequence Diagram – Add Book Copy</a:t>
             </a:r>
             <a:endParaRPr lang="en-US" dirty="0"/>
           </a:p>
@@ -4626,7 +4664,7 @@
       </p:sp>
       <p:pic>
         <p:nvPicPr>
-          <p:cNvPr id="5122" name="Picture 2"/>
+          <p:cNvPr id="5122" name="Picture 2" descr="C:\Users\X230s\workspace\library-management\docs\AddBookCopy.png"/>
           <p:cNvPicPr>
             <a:picLocks noChangeAspect="1" noChangeArrowheads="1"/>
           </p:cNvPicPr>
@@ -4641,53 +4679,13 @@
         </p:blipFill>
         <p:spPr bwMode="auto">
           <a:xfrm>
-            <a:off x="381000" y="1600200"/>
-            <a:ext cx="4332421" cy="3581400"/>
+            <a:off x="304800" y="1447800"/>
+            <a:ext cx="8610600" cy="4959000"/>
           </a:xfrm>
           <a:prstGeom prst="rect">
             <a:avLst/>
           </a:prstGeom>
           <a:noFill/>
-          <a:ln w="9525">
-            <a:noFill/>
-            <a:miter lim="800000"/>
-            <a:headEnd/>
-            <a:tailEnd/>
-          </a:ln>
-          <a:effectLst/>
-        </p:spPr>
-      </p:pic>
-      <p:pic>
-        <p:nvPicPr>
-          <p:cNvPr id="5123" name="Picture 3"/>
-          <p:cNvPicPr>
-            <a:picLocks noChangeAspect="1" noChangeArrowheads="1"/>
-          </p:cNvPicPr>
-          <p:nvPr/>
-        </p:nvPicPr>
-        <p:blipFill>
-          <a:blip r:embed="rId3"/>
-          <a:srcRect/>
-          <a:stretch>
-            <a:fillRect/>
-          </a:stretch>
-        </p:blipFill>
-        <p:spPr bwMode="auto">
-          <a:xfrm>
-            <a:off x="4724400" y="2975934"/>
-            <a:ext cx="4419600" cy="3653466"/>
-          </a:xfrm>
-          <a:prstGeom prst="rect">
-            <a:avLst/>
-          </a:prstGeom>
-          <a:noFill/>
-          <a:ln w="9525">
-            <a:noFill/>
-            <a:miter lim="800000"/>
-            <a:headEnd/>
-            <a:tailEnd/>
-          </a:ln>
-          <a:effectLst/>
         </p:spPr>
       </p:pic>
     </p:spTree>
@@ -4741,7 +4739,7 @@
           <a:p>
             <a:r>
               <a:rPr lang="en-US" dirty="0" smtClean="0"/>
-              <a:t>Screen Shot – Add Book</a:t>
+              <a:t>Screen Shot – Add Book Copy</a:t>
             </a:r>
             <a:endParaRPr lang="en-US" dirty="0"/>
           </a:p>
@@ -4749,7 +4747,7 @@
       </p:sp>
       <p:pic>
         <p:nvPicPr>
-          <p:cNvPr id="6147" name="Picture 3"/>
+          <p:cNvPr id="7170" name="Picture 2"/>
           <p:cNvPicPr>
             <a:picLocks noChangeAspect="1" noChangeArrowheads="1"/>
           </p:cNvPicPr>
@@ -4764,8 +4762,8 @@
         </p:blipFill>
         <p:spPr bwMode="auto">
           <a:xfrm>
-            <a:off x="1447799" y="1371600"/>
-            <a:ext cx="6216354" cy="5120640"/>
+            <a:off x="1371600" y="1371600"/>
+            <a:ext cx="6152031" cy="5120640"/>
           </a:xfrm>
           <a:prstGeom prst="rect">
             <a:avLst/>
@@ -4825,13 +4823,13 @@
         <p:spPr/>
         <p:txBody>
           <a:bodyPr>
-            <a:normAutofit/>
+            <a:normAutofit fontScale="90000"/>
           </a:bodyPr>
           <a:lstStyle/>
           <a:p>
             <a:r>
               <a:rPr lang="en-US" dirty="0" smtClean="0"/>
-              <a:t>Screen Shot – Add Book Copy</a:t>
+              <a:t>Sequence Diagram – Check Out Book</a:t>
             </a:r>
             <a:endParaRPr lang="en-US" dirty="0"/>
           </a:p>
@@ -4839,7 +4837,7 @@
       </p:sp>
       <p:pic>
         <p:nvPicPr>
-          <p:cNvPr id="7170" name="Picture 2"/>
+          <p:cNvPr id="6146" name="Picture 2" descr="C:\Users\X230s\workspace\library-management\docs\Checkout.png"/>
           <p:cNvPicPr>
             <a:picLocks noChangeAspect="1" noChangeArrowheads="1"/>
           </p:cNvPicPr>
@@ -4854,20 +4852,13 @@
         </p:blipFill>
         <p:spPr bwMode="auto">
           <a:xfrm>
-            <a:off x="1371600" y="1371600"/>
-            <a:ext cx="6152031" cy="5120640"/>
+            <a:off x="914400" y="1524000"/>
+            <a:ext cx="7203070" cy="5181600"/>
           </a:xfrm>
           <a:prstGeom prst="rect">
             <a:avLst/>
           </a:prstGeom>
           <a:noFill/>
-          <a:ln w="9525">
-            <a:noFill/>
-            <a:miter lim="800000"/>
-            <a:headEnd/>
-            <a:tailEnd/>
-          </a:ln>
-          <a:effectLst/>
         </p:spPr>
       </p:pic>
     </p:spTree>
@@ -4915,17 +4906,13 @@
         <p:spPr/>
         <p:txBody>
           <a:bodyPr>
-            <a:normAutofit/>
+            <a:normAutofit fontScale="90000"/>
           </a:bodyPr>
           <a:lstStyle/>
           <a:p>
             <a:r>
               <a:rPr lang="en-US" dirty="0" smtClean="0"/>
-              <a:t>Screen Shot – </a:t>
-            </a:r>
-            <a:r>
-              <a:rPr lang="en-US" dirty="0" smtClean="0"/>
-              <a:t>Check Out Book</a:t>
+              <a:t>Sequence Diagram – Check Out Book (contd..)</a:t>
             </a:r>
             <a:endParaRPr lang="en-US" dirty="0"/>
           </a:p>
@@ -4933,7 +4920,7 @@
       </p:sp>
       <p:pic>
         <p:nvPicPr>
-          <p:cNvPr id="8194" name="Picture 2"/>
+          <p:cNvPr id="7170" name="Picture 2" descr="C:\Users\X230s\workspace\library-management\docs\Checkout_contd.png"/>
           <p:cNvPicPr>
             <a:picLocks noChangeAspect="1" noChangeArrowheads="1"/>
           </p:cNvPicPr>
@@ -4948,53 +4935,13 @@
         </p:blipFill>
         <p:spPr bwMode="auto">
           <a:xfrm>
-            <a:off x="304800" y="1371600"/>
-            <a:ext cx="3962400" cy="3275522"/>
+            <a:off x="228600" y="1676400"/>
+            <a:ext cx="8174170" cy="3733800"/>
           </a:xfrm>
           <a:prstGeom prst="rect">
             <a:avLst/>
           </a:prstGeom>
           <a:noFill/>
-          <a:ln w="9525">
-            <a:noFill/>
-            <a:miter lim="800000"/>
-            <a:headEnd/>
-            <a:tailEnd/>
-          </a:ln>
-          <a:effectLst/>
-        </p:spPr>
-      </p:pic>
-      <p:pic>
-        <p:nvPicPr>
-          <p:cNvPr id="8196" name="Picture 4"/>
-          <p:cNvPicPr>
-            <a:picLocks noChangeAspect="1" noChangeArrowheads="1"/>
-          </p:cNvPicPr>
-          <p:nvPr/>
-        </p:nvPicPr>
-        <p:blipFill>
-          <a:blip r:embed="rId3"/>
-          <a:srcRect/>
-          <a:stretch>
-            <a:fillRect/>
-          </a:stretch>
-        </p:blipFill>
-        <p:spPr bwMode="auto">
-          <a:xfrm>
-            <a:off x="4343400" y="2889579"/>
-            <a:ext cx="4800600" cy="3968421"/>
-          </a:xfrm>
-          <a:prstGeom prst="rect">
-            <a:avLst/>
-          </a:prstGeom>
-          <a:noFill/>
-          <a:ln w="9525">
-            <a:noFill/>
-            <a:miter lim="800000"/>
-            <a:headEnd/>
-            <a:tailEnd/>
-          </a:ln>
-          <a:effectLst/>
         </p:spPr>
       </p:pic>
     </p:spTree>
@@ -5048,11 +4995,213 @@
           <a:p>
             <a:r>
               <a:rPr lang="en-US" dirty="0" smtClean="0"/>
-              <a:t>Screen Shot – </a:t>
-            </a:r>
+              <a:t>Screen Shot – Check Out Book</a:t>
+            </a:r>
+            <a:endParaRPr lang="en-US" dirty="0"/>
+          </a:p>
+        </p:txBody>
+      </p:sp>
+      <p:pic>
+        <p:nvPicPr>
+          <p:cNvPr id="8194" name="Picture 2"/>
+          <p:cNvPicPr>
+            <a:picLocks noChangeAspect="1" noChangeArrowheads="1"/>
+          </p:cNvPicPr>
+          <p:nvPr/>
+        </p:nvPicPr>
+        <p:blipFill>
+          <a:blip r:embed="rId2"/>
+          <a:srcRect/>
+          <a:stretch>
+            <a:fillRect/>
+          </a:stretch>
+        </p:blipFill>
+        <p:spPr bwMode="auto">
+          <a:xfrm>
+            <a:off x="304800" y="1371600"/>
+            <a:ext cx="3962400" cy="3275522"/>
+          </a:xfrm>
+          <a:prstGeom prst="rect">
+            <a:avLst/>
+          </a:prstGeom>
+          <a:noFill/>
+          <a:ln w="9525">
+            <a:noFill/>
+            <a:miter lim="800000"/>
+            <a:headEnd/>
+            <a:tailEnd/>
+          </a:ln>
+          <a:effectLst/>
+        </p:spPr>
+      </p:pic>
+      <p:pic>
+        <p:nvPicPr>
+          <p:cNvPr id="8196" name="Picture 4"/>
+          <p:cNvPicPr>
+            <a:picLocks noChangeAspect="1" noChangeArrowheads="1"/>
+          </p:cNvPicPr>
+          <p:nvPr/>
+        </p:nvPicPr>
+        <p:blipFill>
+          <a:blip r:embed="rId3"/>
+          <a:srcRect/>
+          <a:stretch>
+            <a:fillRect/>
+          </a:stretch>
+        </p:blipFill>
+        <p:spPr bwMode="auto">
+          <a:xfrm>
+            <a:off x="4343400" y="2889579"/>
+            <a:ext cx="4800600" cy="3968421"/>
+          </a:xfrm>
+          <a:prstGeom prst="rect">
+            <a:avLst/>
+          </a:prstGeom>
+          <a:noFill/>
+          <a:ln w="9525">
+            <a:noFill/>
+            <a:miter lim="800000"/>
+            <a:headEnd/>
+            <a:tailEnd/>
+          </a:ln>
+          <a:effectLst/>
+        </p:spPr>
+      </p:pic>
+    </p:spTree>
+  </p:cSld>
+  <p:clrMapOvr>
+    <a:masterClrMapping/>
+  </p:clrMapOvr>
+  <p:timing>
+    <p:tnLst>
+      <p:par>
+        <p:cTn id="1" dur="indefinite" restart="never" nodeType="tmRoot"/>
+      </p:par>
+    </p:tnLst>
+  </p:timing>
+</p:sld>
+</file>
+
+<file path=ppt/slides/slide18.xml><?xml version="1.0" encoding="utf-8"?>
+<p:sld xmlns:a="http://schemas.openxmlformats.org/drawingml/2006/main" xmlns:r="http://schemas.openxmlformats.org/officeDocument/2006/relationships" xmlns:p="http://schemas.openxmlformats.org/presentationml/2006/main">
+  <p:cSld>
+    <p:spTree>
+      <p:nvGrpSpPr>
+        <p:cNvPr id="1" name=""/>
+        <p:cNvGrpSpPr/>
+        <p:nvPr/>
+      </p:nvGrpSpPr>
+      <p:grpSpPr>
+        <a:xfrm>
+          <a:off x="0" y="0"/>
+          <a:ext cx="0" cy="0"/>
+          <a:chOff x="0" y="0"/>
+          <a:chExt cx="0" cy="0"/>
+        </a:xfrm>
+      </p:grpSpPr>
+      <p:sp>
+        <p:nvSpPr>
+          <p:cNvPr id="2" name="Title 1"/>
+          <p:cNvSpPr>
+            <a:spLocks noGrp="1"/>
+          </p:cNvSpPr>
+          <p:nvPr>
+            <p:ph type="title"/>
+          </p:nvPr>
+        </p:nvSpPr>
+        <p:spPr/>
+        <p:txBody>
+          <a:bodyPr>
+            <a:normAutofit fontScale="90000"/>
+          </a:bodyPr>
+          <a:lstStyle/>
+          <a:p>
             <a:r>
               <a:rPr lang="en-US" dirty="0" smtClean="0"/>
-              <a:t>Check In Book</a:t>
+              <a:t>Sequence Diagram – Check In Book</a:t>
+            </a:r>
+            <a:endParaRPr lang="en-US" dirty="0"/>
+          </a:p>
+        </p:txBody>
+      </p:sp>
+      <p:pic>
+        <p:nvPicPr>
+          <p:cNvPr id="8194" name="Picture 2" descr="C:\Users\X230s\workspace\library-management\docs\CheckIn.png"/>
+          <p:cNvPicPr>
+            <a:picLocks noChangeAspect="1" noChangeArrowheads="1"/>
+          </p:cNvPicPr>
+          <p:nvPr/>
+        </p:nvPicPr>
+        <p:blipFill>
+          <a:blip r:embed="rId2"/>
+          <a:srcRect/>
+          <a:stretch>
+            <a:fillRect/>
+          </a:stretch>
+        </p:blipFill>
+        <p:spPr bwMode="auto">
+          <a:xfrm>
+            <a:off x="304800" y="1905000"/>
+            <a:ext cx="8482263" cy="3581400"/>
+          </a:xfrm>
+          <a:prstGeom prst="rect">
+            <a:avLst/>
+          </a:prstGeom>
+          <a:noFill/>
+        </p:spPr>
+      </p:pic>
+    </p:spTree>
+  </p:cSld>
+  <p:clrMapOvr>
+    <a:masterClrMapping/>
+  </p:clrMapOvr>
+  <p:timing>
+    <p:tnLst>
+      <p:par>
+        <p:cTn id="1" dur="indefinite" restart="never" nodeType="tmRoot"/>
+      </p:par>
+    </p:tnLst>
+  </p:timing>
+</p:sld>
+</file>
+
+<file path=ppt/slides/slide19.xml><?xml version="1.0" encoding="utf-8"?>
+<p:sld xmlns:a="http://schemas.openxmlformats.org/drawingml/2006/main" xmlns:r="http://schemas.openxmlformats.org/officeDocument/2006/relationships" xmlns:p="http://schemas.openxmlformats.org/presentationml/2006/main">
+  <p:cSld>
+    <p:spTree>
+      <p:nvGrpSpPr>
+        <p:cNvPr id="1" name=""/>
+        <p:cNvGrpSpPr/>
+        <p:nvPr/>
+      </p:nvGrpSpPr>
+      <p:grpSpPr>
+        <a:xfrm>
+          <a:off x="0" y="0"/>
+          <a:ext cx="0" cy="0"/>
+          <a:chOff x="0" y="0"/>
+          <a:chExt cx="0" cy="0"/>
+        </a:xfrm>
+      </p:grpSpPr>
+      <p:sp>
+        <p:nvSpPr>
+          <p:cNvPr id="2" name="Title 1"/>
+          <p:cNvSpPr>
+            <a:spLocks noGrp="1"/>
+          </p:cNvSpPr>
+          <p:nvPr>
+            <p:ph type="title"/>
+          </p:nvPr>
+        </p:nvSpPr>
+        <p:spPr/>
+        <p:txBody>
+          <a:bodyPr>
+            <a:normAutofit/>
+          </a:bodyPr>
+          <a:lstStyle/>
+          <a:p>
+            <a:r>
+              <a:rPr lang="en-US" dirty="0" smtClean="0"/>
+              <a:t>Screen Shot – Check In Book</a:t>
             </a:r>
             <a:endParaRPr lang="en-US" dirty="0"/>
           </a:p>
@@ -5106,7 +5255,88 @@
 </p:sld>
 </file>
 
-<file path=ppt/slides/slide18.xml><?xml version="1.0" encoding="utf-8"?>
+<file path=ppt/slides/slide2.xml><?xml version="1.0" encoding="utf-8"?>
+<p:sld xmlns:a="http://schemas.openxmlformats.org/drawingml/2006/main" xmlns:r="http://schemas.openxmlformats.org/officeDocument/2006/relationships" xmlns:p="http://schemas.openxmlformats.org/presentationml/2006/main">
+  <p:cSld>
+    <p:spTree>
+      <p:nvGrpSpPr>
+        <p:cNvPr id="1" name=""/>
+        <p:cNvGrpSpPr/>
+        <p:nvPr/>
+      </p:nvGrpSpPr>
+      <p:grpSpPr>
+        <a:xfrm>
+          <a:off x="0" y="0"/>
+          <a:ext cx="0" cy="0"/>
+          <a:chOff x="0" y="0"/>
+          <a:chExt cx="0" cy="0"/>
+        </a:xfrm>
+      </p:grpSpPr>
+      <p:sp>
+        <p:nvSpPr>
+          <p:cNvPr id="2" name="Title 1"/>
+          <p:cNvSpPr>
+            <a:spLocks noGrp="1"/>
+          </p:cNvSpPr>
+          <p:nvPr>
+            <p:ph type="title"/>
+          </p:nvPr>
+        </p:nvSpPr>
+        <p:spPr/>
+        <p:txBody>
+          <a:bodyPr/>
+          <a:lstStyle/>
+          <a:p>
+            <a:r>
+              <a:rPr lang="en-US" dirty="0" smtClean="0"/>
+              <a:t>Class Diagram</a:t>
+            </a:r>
+            <a:endParaRPr lang="en-US" dirty="0"/>
+          </a:p>
+        </p:txBody>
+      </p:sp>
+      <p:pic>
+        <p:nvPicPr>
+          <p:cNvPr id="2052" name="Picture 4" descr="C:\Users\X230s\workspace\library-management\docs\LibrarySystem_ClassDiagram.png"/>
+          <p:cNvPicPr>
+            <a:picLocks noChangeAspect="1" noChangeArrowheads="1"/>
+          </p:cNvPicPr>
+          <p:nvPr/>
+        </p:nvPicPr>
+        <p:blipFill>
+          <a:blip r:embed="rId2"/>
+          <a:srcRect/>
+          <a:stretch>
+            <a:fillRect/>
+          </a:stretch>
+        </p:blipFill>
+        <p:spPr bwMode="auto">
+          <a:xfrm>
+            <a:off x="381000" y="1295400"/>
+            <a:ext cx="8582479" cy="3962400"/>
+          </a:xfrm>
+          <a:prstGeom prst="rect">
+            <a:avLst/>
+          </a:prstGeom>
+          <a:noFill/>
+        </p:spPr>
+      </p:pic>
+    </p:spTree>
+  </p:cSld>
+  <p:clrMapOvr>
+    <a:masterClrMapping/>
+  </p:clrMapOvr>
+  <p:timing>
+    <p:tnLst>
+      <p:par>
+        <p:cTn id="1" dur="indefinite" restart="never" nodeType="tmRoot"/>
+      </p:par>
+    </p:tnLst>
+  </p:timing>
+</p:sld>
+</file>
+
+<file path=ppt/slides/slide20.xml><?xml version="1.0" encoding="utf-8"?>
 <p:sld xmlns:a="http://schemas.openxmlformats.org/drawingml/2006/main" xmlns:r="http://schemas.openxmlformats.org/officeDocument/2006/relationships" xmlns:p="http://schemas.openxmlformats.org/presentationml/2006/main">
   <p:cSld>
     <p:spTree>
@@ -5164,7 +5394,7 @@
 </p:sld>
 </file>
 
-<file path=ppt/slides/slide19.xml><?xml version="1.0" encoding="utf-8"?>
+<file path=ppt/slides/slide21.xml><?xml version="1.0" encoding="utf-8"?>
 <p:sld xmlns:a="http://schemas.openxmlformats.org/drawingml/2006/main" xmlns:r="http://schemas.openxmlformats.org/officeDocument/2006/relationships" xmlns:p="http://schemas.openxmlformats.org/presentationml/2006/main">
   <p:cSld>
     <p:spTree>
@@ -5222,87 +5452,6 @@
 </p:sld>
 </file>
 
-<file path=ppt/slides/slide2.xml><?xml version="1.0" encoding="utf-8"?>
-<p:sld xmlns:a="http://schemas.openxmlformats.org/drawingml/2006/main" xmlns:r="http://schemas.openxmlformats.org/officeDocument/2006/relationships" xmlns:p="http://schemas.openxmlformats.org/presentationml/2006/main">
-  <p:cSld>
-    <p:spTree>
-      <p:nvGrpSpPr>
-        <p:cNvPr id="1" name=""/>
-        <p:cNvGrpSpPr/>
-        <p:nvPr/>
-      </p:nvGrpSpPr>
-      <p:grpSpPr>
-        <a:xfrm>
-          <a:off x="0" y="0"/>
-          <a:ext cx="0" cy="0"/>
-          <a:chOff x="0" y="0"/>
-          <a:chExt cx="0" cy="0"/>
-        </a:xfrm>
-      </p:grpSpPr>
-      <p:sp>
-        <p:nvSpPr>
-          <p:cNvPr id="2" name="Title 1"/>
-          <p:cNvSpPr>
-            <a:spLocks noGrp="1"/>
-          </p:cNvSpPr>
-          <p:nvPr>
-            <p:ph type="title"/>
-          </p:nvPr>
-        </p:nvSpPr>
-        <p:spPr/>
-        <p:txBody>
-          <a:bodyPr/>
-          <a:lstStyle/>
-          <a:p>
-            <a:r>
-              <a:rPr lang="en-US" dirty="0" smtClean="0"/>
-              <a:t>Class Diagram</a:t>
-            </a:r>
-            <a:endParaRPr lang="en-US" dirty="0"/>
-          </a:p>
-        </p:txBody>
-      </p:sp>
-      <p:pic>
-        <p:nvPicPr>
-          <p:cNvPr id="1026" name="Picture 2" descr="C:\Users\X230s\workspace\library-management\docs\LibrarySystem_ClassDiagram.png"/>
-          <p:cNvPicPr>
-            <a:picLocks noChangeAspect="1" noChangeArrowheads="1"/>
-          </p:cNvPicPr>
-          <p:nvPr/>
-        </p:nvPicPr>
-        <p:blipFill>
-          <a:blip r:embed="rId2"/>
-          <a:srcRect/>
-          <a:stretch>
-            <a:fillRect/>
-          </a:stretch>
-        </p:blipFill>
-        <p:spPr bwMode="auto">
-          <a:xfrm>
-            <a:off x="1143001" y="1295400"/>
-            <a:ext cx="7696200" cy="3691993"/>
-          </a:xfrm>
-          <a:prstGeom prst="rect">
-            <a:avLst/>
-          </a:prstGeom>
-          <a:noFill/>
-        </p:spPr>
-      </p:pic>
-    </p:spTree>
-  </p:cSld>
-  <p:clrMapOvr>
-    <a:masterClrMapping/>
-  </p:clrMapOvr>
-  <p:timing>
-    <p:tnLst>
-      <p:par>
-        <p:cTn id="1" dur="indefinite" restart="never" nodeType="tmRoot"/>
-      </p:par>
-    </p:tnLst>
-  </p:timing>
-</p:sld>
-</file>
-
 <file path=ppt/slides/slide3.xml><?xml version="1.0" encoding="utf-8"?>
 <p:sld xmlns:a="http://schemas.openxmlformats.org/drawingml/2006/main" xmlns:r="http://schemas.openxmlformats.org/officeDocument/2006/relationships" xmlns:p="http://schemas.openxmlformats.org/presentationml/2006/main">
   <p:cSld>
@@ -5337,38 +5486,75 @@
           <a:p>
             <a:r>
               <a:rPr lang="en-US" dirty="0" smtClean="0"/>
-              <a:t>Sequence Diagram - Login</a:t>
+              <a:t>Features</a:t>
             </a:r>
             <a:endParaRPr lang="en-US" dirty="0"/>
           </a:p>
         </p:txBody>
       </p:sp>
-      <p:pic>
-        <p:nvPicPr>
-          <p:cNvPr id="2050" name="Picture 2" descr="C:\Users\X230s\workspace\library-management\docs\Login.png"/>
-          <p:cNvPicPr>
-            <a:picLocks noChangeAspect="1" noChangeArrowheads="1"/>
-          </p:cNvPicPr>
-          <p:nvPr/>
-        </p:nvPicPr>
-        <p:blipFill>
-          <a:blip r:embed="rId2"/>
-          <a:srcRect/>
-          <a:stretch>
-            <a:fillRect/>
-          </a:stretch>
-        </p:blipFill>
-        <p:spPr bwMode="auto">
+      <p:sp>
+        <p:nvSpPr>
+          <p:cNvPr id="3" name="Content Placeholder 2"/>
+          <p:cNvSpPr>
+            <a:spLocks noGrp="1"/>
+          </p:cNvSpPr>
+          <p:nvPr>
+            <p:ph idx="1"/>
+          </p:nvPr>
+        </p:nvSpPr>
+        <p:spPr>
           <a:xfrm>
-            <a:off x="1143000" y="1560149"/>
-            <a:ext cx="7720748" cy="3926251"/>
-          </a:xfrm>
-          <a:prstGeom prst="rect">
-            <a:avLst/>
-          </a:prstGeom>
-          <a:noFill/>
-        </p:spPr>
-      </p:pic>
+            <a:off x="1435608" y="1447800"/>
+            <a:ext cx="7498080" cy="4648200"/>
+          </a:xfrm>
+        </p:spPr>
+        <p:txBody>
+          <a:bodyPr/>
+          <a:lstStyle/>
+          <a:p>
+            <a:r>
+              <a:rPr lang="en-US" dirty="0" smtClean="0"/>
+              <a:t>Add New Library Member</a:t>
+            </a:r>
+          </a:p>
+          <a:p>
+            <a:r>
+              <a:rPr lang="en-US" dirty="0" smtClean="0"/>
+              <a:t>Edit Library Member</a:t>
+            </a:r>
+          </a:p>
+          <a:p>
+            <a:r>
+              <a:rPr lang="en-US" dirty="0" smtClean="0"/>
+              <a:t>Add Book</a:t>
+            </a:r>
+          </a:p>
+          <a:p>
+            <a:r>
+              <a:rPr lang="en-US" dirty="0" smtClean="0"/>
+              <a:t>Add Book Copy</a:t>
+            </a:r>
+          </a:p>
+          <a:p>
+            <a:r>
+              <a:rPr lang="en-US" dirty="0" smtClean="0"/>
+              <a:t>Add Author</a:t>
+            </a:r>
+          </a:p>
+          <a:p>
+            <a:r>
+              <a:rPr lang="en-US" dirty="0" smtClean="0"/>
+              <a:t>Check out Book</a:t>
+            </a:r>
+          </a:p>
+          <a:p>
+            <a:r>
+              <a:rPr lang="en-US" dirty="0" smtClean="0"/>
+              <a:t>Check In Book</a:t>
+            </a:r>
+          </a:p>
+        </p:txBody>
+      </p:sp>
     </p:spTree>
   </p:cSld>
   <p:clrMapOvr>
@@ -5413,45 +5599,57 @@
         </p:nvSpPr>
         <p:spPr/>
         <p:txBody>
-          <a:bodyPr>
-            <a:normAutofit fontScale="90000"/>
-          </a:bodyPr>
+          <a:bodyPr/>
           <a:lstStyle/>
           <a:p>
             <a:r>
               <a:rPr lang="en-US" dirty="0" smtClean="0"/>
-              <a:t>Sequence Diagram – Add New Library Member</a:t>
+              <a:t>Data Files</a:t>
             </a:r>
             <a:endParaRPr lang="en-US" dirty="0"/>
           </a:p>
         </p:txBody>
       </p:sp>
-      <p:pic>
-        <p:nvPicPr>
-          <p:cNvPr id="3074" name="Picture 2" descr="C:\Users\X230s\workspace\library-management\docs\AddNewLibraryMember.png"/>
-          <p:cNvPicPr>
-            <a:picLocks noChangeAspect="1" noChangeArrowheads="1"/>
-          </p:cNvPicPr>
-          <p:nvPr/>
-        </p:nvPicPr>
-        <p:blipFill>
-          <a:blip r:embed="rId2"/>
-          <a:srcRect/>
-          <a:stretch>
-            <a:fillRect/>
-          </a:stretch>
-        </p:blipFill>
-        <p:spPr bwMode="auto">
-          <a:xfrm>
-            <a:off x="1066801" y="1676400"/>
-            <a:ext cx="7848600" cy="4262348"/>
-          </a:xfrm>
-          <a:prstGeom prst="rect">
-            <a:avLst/>
-          </a:prstGeom>
-          <a:noFill/>
-        </p:spPr>
-      </p:pic>
+      <p:sp>
+        <p:nvSpPr>
+          <p:cNvPr id="3" name="Content Placeholder 2"/>
+          <p:cNvSpPr>
+            <a:spLocks noGrp="1"/>
+          </p:cNvSpPr>
+          <p:nvPr>
+            <p:ph idx="1"/>
+          </p:nvPr>
+        </p:nvSpPr>
+        <p:spPr/>
+        <p:txBody>
+          <a:bodyPr/>
+          <a:lstStyle/>
+          <a:p>
+            <a:r>
+              <a:rPr lang="en-US" dirty="0" smtClean="0"/>
+              <a:t>storage\user.bin</a:t>
+            </a:r>
+          </a:p>
+          <a:p>
+            <a:r>
+              <a:rPr lang="en-US" dirty="0" smtClean="0"/>
+              <a:t>storage\book.bin</a:t>
+            </a:r>
+          </a:p>
+          <a:p>
+            <a:r>
+              <a:rPr lang="en-US" dirty="0" smtClean="0"/>
+              <a:t>storage\library_members.bin</a:t>
+            </a:r>
+          </a:p>
+          <a:p>
+            <a:pPr>
+              <a:buNone/>
+            </a:pPr>
+            <a:endParaRPr lang="en-US" dirty="0"/>
+          </a:p>
+        </p:txBody>
+      </p:sp>
     </p:spTree>
   </p:cSld>
   <p:clrMapOvr>
@@ -5496,14 +5694,12 @@
         </p:nvSpPr>
         <p:spPr/>
         <p:txBody>
-          <a:bodyPr>
-            <a:normAutofit fontScale="90000"/>
-          </a:bodyPr>
+          <a:bodyPr/>
           <a:lstStyle/>
           <a:p>
             <a:r>
               <a:rPr lang="en-US" dirty="0" smtClean="0"/>
-              <a:t>Sequence Diagram – Edit New Library Member</a:t>
+              <a:t>Sequence Diagram - Login</a:t>
             </a:r>
             <a:endParaRPr lang="en-US" dirty="0"/>
           </a:p>
@@ -5511,7 +5707,7 @@
       </p:sp>
       <p:pic>
         <p:nvPicPr>
-          <p:cNvPr id="4098" name="Picture 2" descr="C:\Users\X230s\workspace\library-management\docs\EditLibraryMember.png"/>
+          <p:cNvPr id="1026" name="Picture 2" descr="C:\Users\X230s\workspace\library-management\docs\Login.png"/>
           <p:cNvPicPr>
             <a:picLocks noChangeAspect="1" noChangeArrowheads="1"/>
           </p:cNvPicPr>
@@ -5526,8 +5722,8 @@
         </p:blipFill>
         <p:spPr bwMode="auto">
           <a:xfrm>
-            <a:off x="1066800" y="1905000"/>
-            <a:ext cx="7922961" cy="4343400"/>
+            <a:off x="381000" y="1447800"/>
+            <a:ext cx="8401050" cy="4272206"/>
           </a:xfrm>
           <a:prstGeom prst="rect">
             <a:avLst/>
@@ -5586,7 +5782,7 @@
           <a:p>
             <a:r>
               <a:rPr lang="en-US" dirty="0" smtClean="0"/>
-              <a:t>Sequence Diagram – Add Book</a:t>
+              <a:t>Screen Shot - Login</a:t>
             </a:r>
             <a:endParaRPr lang="en-US" dirty="0"/>
           </a:p>
@@ -5594,7 +5790,7 @@
       </p:sp>
       <p:pic>
         <p:nvPicPr>
-          <p:cNvPr id="5122" name="Picture 2" descr="C:\Users\X230s\workspace\library-management\docs\AddBook.png"/>
+          <p:cNvPr id="1026" name="Picture 2" descr="C:\Users\X230s\Google Drive\MUM\MPP\Project\docs\Login.png"/>
           <p:cNvPicPr>
             <a:picLocks noChangeAspect="1" noChangeArrowheads="1"/>
           </p:cNvPicPr>
@@ -5609,13 +5805,112 @@
         </p:blipFill>
         <p:spPr bwMode="auto">
           <a:xfrm>
-            <a:off x="1295400" y="1447800"/>
-            <a:ext cx="7620000" cy="4911576"/>
+            <a:off x="152400" y="1828800"/>
+            <a:ext cx="2884765" cy="3200400"/>
           </a:xfrm>
           <a:prstGeom prst="rect">
             <a:avLst/>
           </a:prstGeom>
           <a:noFill/>
+        </p:spPr>
+      </p:pic>
+      <p:pic>
+        <p:nvPicPr>
+          <p:cNvPr id="1027" name="Picture 3"/>
+          <p:cNvPicPr>
+            <a:picLocks noChangeAspect="1" noChangeArrowheads="1"/>
+          </p:cNvPicPr>
+          <p:nvPr/>
+        </p:nvPicPr>
+        <p:blipFill>
+          <a:blip r:embed="rId3" cstate="print"/>
+          <a:srcRect/>
+          <a:stretch>
+            <a:fillRect/>
+          </a:stretch>
+        </p:blipFill>
+        <p:spPr bwMode="auto">
+          <a:xfrm>
+            <a:off x="3200400" y="1219200"/>
+            <a:ext cx="2581016" cy="2133600"/>
+          </a:xfrm>
+          <a:prstGeom prst="rect">
+            <a:avLst/>
+          </a:prstGeom>
+          <a:noFill/>
+          <a:ln w="9525">
+            <a:noFill/>
+            <a:miter lim="800000"/>
+            <a:headEnd/>
+            <a:tailEnd/>
+          </a:ln>
+          <a:effectLst/>
+        </p:spPr>
+      </p:pic>
+      <p:pic>
+        <p:nvPicPr>
+          <p:cNvPr id="1028" name="Picture 4"/>
+          <p:cNvPicPr>
+            <a:picLocks noChangeAspect="1" noChangeArrowheads="1"/>
+          </p:cNvPicPr>
+          <p:nvPr/>
+        </p:nvPicPr>
+        <p:blipFill>
+          <a:blip r:embed="rId4" cstate="print"/>
+          <a:srcRect/>
+          <a:stretch>
+            <a:fillRect/>
+          </a:stretch>
+        </p:blipFill>
+        <p:spPr bwMode="auto">
+          <a:xfrm>
+            <a:off x="6019800" y="1219200"/>
+            <a:ext cx="2626454" cy="2171160"/>
+          </a:xfrm>
+          <a:prstGeom prst="rect">
+            <a:avLst/>
+          </a:prstGeom>
+          <a:noFill/>
+          <a:ln w="9525">
+            <a:noFill/>
+            <a:miter lim="800000"/>
+            <a:headEnd/>
+            <a:tailEnd/>
+          </a:ln>
+          <a:effectLst/>
+        </p:spPr>
+      </p:pic>
+      <p:pic>
+        <p:nvPicPr>
+          <p:cNvPr id="1029" name="Picture 5"/>
+          <p:cNvPicPr>
+            <a:picLocks noChangeAspect="1" noChangeArrowheads="1"/>
+          </p:cNvPicPr>
+          <p:nvPr/>
+        </p:nvPicPr>
+        <p:blipFill>
+          <a:blip r:embed="rId5"/>
+          <a:srcRect/>
+          <a:stretch>
+            <a:fillRect/>
+          </a:stretch>
+        </p:blipFill>
+        <p:spPr bwMode="auto">
+          <a:xfrm>
+            <a:off x="3810000" y="3352800"/>
+            <a:ext cx="4482864" cy="3048000"/>
+          </a:xfrm>
+          <a:prstGeom prst="rect">
+            <a:avLst/>
+          </a:prstGeom>
+          <a:noFill/>
+          <a:ln w="9525">
+            <a:noFill/>
+            <a:miter lim="800000"/>
+            <a:headEnd/>
+            <a:tailEnd/>
+          </a:ln>
+          <a:effectLst/>
         </p:spPr>
       </p:pic>
     </p:spTree>
@@ -5669,7 +5964,7 @@
           <a:p>
             <a:r>
               <a:rPr lang="en-US" dirty="0" smtClean="0"/>
-              <a:t>Sequence Diagram – Add Book Copy</a:t>
+              <a:t>Sequence Diagram – Add New Library Member</a:t>
             </a:r>
             <a:endParaRPr lang="en-US" dirty="0"/>
           </a:p>
@@ -5677,7 +5972,7 @@
       </p:sp>
       <p:pic>
         <p:nvPicPr>
-          <p:cNvPr id="6147" name="Picture 3" descr="C:\Users\X230s\workspace\library-management\docs\AddBookCopy.png"/>
+          <p:cNvPr id="2050" name="Picture 2" descr="C:\Users\X230s\workspace\library-management\docs\AddNewLibraryMember.png"/>
           <p:cNvPicPr>
             <a:picLocks noChangeAspect="1" noChangeArrowheads="1"/>
           </p:cNvPicPr>
@@ -5692,8 +5987,8 @@
         </p:blipFill>
         <p:spPr bwMode="auto">
           <a:xfrm>
-            <a:off x="1143001" y="1676401"/>
-            <a:ext cx="7789076" cy="4343400"/>
+            <a:off x="304800" y="1447800"/>
+            <a:ext cx="8458200" cy="5000544"/>
           </a:xfrm>
           <a:prstGeom prst="rect">
             <a:avLst/>
@@ -5752,7 +6047,7 @@
           <a:p>
             <a:r>
               <a:rPr lang="en-US" dirty="0" smtClean="0"/>
-              <a:t>Sequence Diagram – Check Out Book</a:t>
+              <a:t>Screen Shot – Add New Library Member</a:t>
             </a:r>
             <a:endParaRPr lang="en-US" dirty="0"/>
           </a:p>
@@ -5760,7 +6055,7 @@
       </p:sp>
       <p:pic>
         <p:nvPicPr>
-          <p:cNvPr id="1026" name="Picture 2" descr="C:\Users\X230s\workspace\library-management\docs\Checkout.png"/>
+          <p:cNvPr id="4098" name="Picture 2"/>
           <p:cNvPicPr>
             <a:picLocks noChangeAspect="1" noChangeArrowheads="1"/>
           </p:cNvPicPr>
@@ -5775,13 +6070,20 @@
         </p:blipFill>
         <p:spPr bwMode="auto">
           <a:xfrm>
-            <a:off x="1600200" y="1371600"/>
-            <a:ext cx="7315200" cy="5262262"/>
+            <a:off x="1600200" y="1497582"/>
+            <a:ext cx="6190679" cy="5117530"/>
           </a:xfrm>
           <a:prstGeom prst="rect">
             <a:avLst/>
           </a:prstGeom>
           <a:noFill/>
+          <a:ln w="9525">
+            <a:noFill/>
+            <a:miter lim="800000"/>
+            <a:headEnd/>
+            <a:tailEnd/>
+          </a:ln>
+          <a:effectLst/>
         </p:spPr>
       </p:pic>
     </p:spTree>
@@ -5835,11 +6137,7 @@
           <a:p>
             <a:r>
               <a:rPr lang="en-US" dirty="0" smtClean="0"/>
-              <a:t>Sequence Diagram – Check Out </a:t>
-            </a:r>
-            <a:r>
-              <a:rPr lang="en-US" dirty="0" smtClean="0"/>
-              <a:t>Book (contd..)</a:t>
+              <a:t>Sequence Diagram – Edit New Library Member</a:t>
             </a:r>
             <a:endParaRPr lang="en-US" dirty="0"/>
           </a:p>
@@ -5847,7 +6145,7 @@
       </p:sp>
       <p:pic>
         <p:nvPicPr>
-          <p:cNvPr id="2050" name="Picture 2" descr="C:\Users\X230s\workspace\library-management\docs\Checkout_contd.png"/>
+          <p:cNvPr id="3074" name="Picture 2" descr="C:\Users\X230s\workspace\library-management\docs\EditLibraryMember.png"/>
           <p:cNvPicPr>
             <a:picLocks noChangeAspect="1" noChangeArrowheads="1"/>
           </p:cNvPicPr>
@@ -5862,8 +6160,8 @@
         </p:blipFill>
         <p:spPr bwMode="auto">
           <a:xfrm>
-            <a:off x="457200" y="1981200"/>
-            <a:ext cx="8507810" cy="3886200"/>
+            <a:off x="304799" y="1447800"/>
+            <a:ext cx="8479407" cy="4953000"/>
           </a:xfrm>
           <a:prstGeom prst="rect">
             <a:avLst/>

</xml_diff>